<commit_message>
updated programming concepts ii, still have some unfinished slides but will address after asking Brandon
</commit_message>
<xml_diff>
--- a/2017/python/B Done - ish/Python - Programming Concepts II.pptx
+++ b/2017/python/B Done - ish/Python - Programming Concepts II.pptx
@@ -10614,67 +10614,48 @@
                 <a:cs typeface="Menlo Regular"/>
                 <a:sym typeface="Courier New"/>
               </a:rPr>
-              <a:t>&gt;&gt;&gt; </a:t>
+              <a:t>&gt;&gt;&gt; states </a:t>
+            </a:r>
+            <a:r>
+              <a:rPr lang="en" sz="2400" dirty="0">
+                <a:solidFill>
+                  <a:schemeClr val="tx1"/>
+                </a:solidFill>
+                <a:latin typeface="Menlo Regular"/>
+                <a:cs typeface="Menlo Regular"/>
+                <a:sym typeface="Courier New"/>
+              </a:rPr>
+              <a:t>= {</a:t>
+            </a:r>
+            <a:r>
+              <a:rPr lang="en" sz="2400" dirty="0">
+                <a:solidFill>
+                  <a:srgbClr val="D20035"/>
+                </a:solidFill>
+                <a:latin typeface="Menlo Regular"/>
+                <a:cs typeface="Menlo Regular"/>
+                <a:sym typeface="Courier New"/>
+              </a:rPr>
+              <a:t>"</a:t>
             </a:r>
             <a:r>
               <a:rPr lang="en" sz="2400" dirty="0" smtClean="0">
                 <a:solidFill>
-                  <a:schemeClr val="tx1"/>
-                </a:solidFill>
-                <a:latin typeface="Menlo Regular"/>
-                <a:cs typeface="Menlo Regular"/>
-                <a:sym typeface="Courier New"/>
-              </a:rPr>
-              <a:t>states </a:t>
-            </a:r>
-            <a:r>
-              <a:rPr lang="en" sz="2400" dirty="0">
-                <a:solidFill>
-                  <a:schemeClr val="tx1"/>
-                </a:solidFill>
-                <a:latin typeface="Menlo Regular"/>
-                <a:cs typeface="Menlo Regular"/>
-                <a:sym typeface="Courier New"/>
-              </a:rPr>
-              <a:t>= {</a:t>
-            </a:r>
-            <a:r>
-              <a:rPr lang="en" sz="2400" dirty="0">
-                <a:solidFill>
                   <a:srgbClr val="D20035"/>
                 </a:solidFill>
                 <a:latin typeface="Menlo Regular"/>
                 <a:cs typeface="Menlo Regular"/>
                 <a:sym typeface="Courier New"/>
               </a:rPr>
-              <a:t>"</a:t>
+              <a:t>VA“</a:t>
             </a:r>
             <a:r>
               <a:rPr lang="en" sz="2400" dirty="0" smtClean="0">
-                <a:solidFill>
-                  <a:srgbClr val="D20035"/>
-                </a:solidFill>
-                <a:latin typeface="Menlo Regular"/>
-                <a:cs typeface="Menlo Regular"/>
-                <a:sym typeface="Courier New"/>
-              </a:rPr>
-              <a:t>VA“</a:t>
-            </a:r>
-            <a:r>
-              <a:rPr lang="en" sz="2400" dirty="0" smtClean="0">
-                <a:latin typeface="Menlo Regular"/>
-                <a:cs typeface="Menlo Regular"/>
-                <a:sym typeface="Courier New"/>
-              </a:rPr>
-              <a:t>:</a:t>
-            </a:r>
-            <a:r>
-              <a:rPr lang="en" sz="2400" dirty="0" smtClean="0">
-                <a:latin typeface="Menlo Regular"/>
-                <a:cs typeface="Menlo Regular"/>
-                <a:sym typeface="Courier New"/>
-              </a:rPr>
-              <a:t> </a:t>
+                <a:latin typeface="Menlo Regular"/>
+                <a:cs typeface="Menlo Regular"/>
+                <a:sym typeface="Courier New"/>
+              </a:rPr>
+              <a:t>: </a:t>
             </a:r>
             <a:r>
               <a:rPr lang="en" sz="2400" dirty="0">
@@ -12240,16 +12221,7 @@
                 <a:cs typeface="Open Sans"/>
                 <a:sym typeface="Open Sans"/>
               </a:rPr>
-              <a:t>more </a:t>
-            </a:r>
-            <a:r>
-              <a:rPr lang="en" dirty="0" smtClean="0">
-                <a:latin typeface="Open Sans"/>
-                <a:ea typeface="Open Sans"/>
-                <a:cs typeface="Open Sans"/>
-                <a:sym typeface="Open Sans"/>
-              </a:rPr>
-              <a:t>methods and things to do with list! </a:t>
+              <a:t>more methods and things to do with list! </a:t>
             </a:r>
             <a:r>
               <a:rPr lang="en" dirty="0">
@@ -12560,19 +12532,7 @@
                 <a:cs typeface="Menlo Regular"/>
                 <a:sym typeface="Courier New"/>
               </a:rPr>
-              <a:t>…	print(</a:t>
-            </a:r>
-            <a:r>
-              <a:rPr lang="en" sz="2400" dirty="0" smtClean="0">
-                <a:solidFill>
-                  <a:schemeClr val="tx1"/>
-                </a:solidFill>
-                <a:latin typeface="Menlo Regular"/>
-                <a:ea typeface="Menlo Regular"/>
-                <a:cs typeface="Menlo Regular"/>
-                <a:sym typeface="Courier New"/>
-              </a:rPr>
-              <a:t>fruits[</a:t>
+              <a:t>…	print(fruits[</a:t>
             </a:r>
             <a:r>
               <a:rPr lang="en" sz="2400" dirty="0" smtClean="0">
@@ -13453,19 +13413,7 @@
                 <a:cs typeface="Menlo Regular"/>
                 <a:sym typeface="Courier New"/>
               </a:rPr>
-              <a:t>or</a:t>
-            </a:r>
-            <a:r>
-              <a:rPr lang="en" sz="1800" dirty="0" smtClean="0">
-                <a:solidFill>
-                  <a:srgbClr val="000000"/>
-                </a:solidFill>
-                <a:latin typeface="Menlo Regular"/>
-                <a:ea typeface="Menlo Regular"/>
-                <a:cs typeface="Menlo Regular"/>
-                <a:sym typeface="Courier New"/>
-              </a:rPr>
-              <a:t> </a:t>
+              <a:t>or </a:t>
             </a:r>
             <a:r>
               <a:rPr lang="en" sz="1800" dirty="0">
@@ -15116,17 +15064,7 @@
                 <a:ea typeface="Ubuntu"/>
                 <a:sym typeface="Ubuntu"/>
               </a:rPr>
-              <a:t>while</a:t>
-            </a:r>
-            <a:r>
-              <a:rPr lang="en" sz="2400" i="1" dirty="0" smtClean="0">
-                <a:solidFill>
-                  <a:schemeClr val="bg2"/>
-                </a:solidFill>
-                <a:ea typeface="Ubuntu"/>
-                <a:sym typeface="Ubuntu"/>
-              </a:rPr>
-              <a:t> </a:t>
+              <a:t>while </a:t>
             </a:r>
             <a:r>
               <a:rPr lang="en" sz="2400" dirty="0" smtClean="0">
@@ -17066,7 +17004,7 @@
               <a:t>Update </a:t>
             </a:r>
             <a:r>
-              <a:rPr lang="en" dirty="0">
+              <a:rPr lang="en" dirty="0" smtClean="0">
                 <a:solidFill>
                   <a:srgbClr val="0B5C92"/>
                 </a:solidFill>
@@ -17075,11 +17013,15 @@
                 <a:cs typeface="Menlo Regular"/>
                 <a:sym typeface="Courier New"/>
               </a:rPr>
-              <a:t>hello.rb</a:t>
+              <a:t>hello.py</a:t>
+            </a:r>
+            <a:r>
+              <a:rPr lang="en" dirty="0" smtClean="0"/>
+              <a:t> </a:t>
             </a:r>
             <a:r>
               <a:rPr lang="en" dirty="0"/>
-              <a:t> with the following</a:t>
+              <a:t>with the following</a:t>
             </a:r>
           </a:p>
           <a:p>
@@ -17089,7 +17031,7 @@
               </a:spcBef>
               <a:buNone/>
             </a:pPr>
-            <a:endParaRPr dirty="0"/>
+            <a:endParaRPr lang="en-US" dirty="0" smtClean="0"/>
           </a:p>
           <a:p>
             <a:pPr lvl="0" rtl="0">
@@ -17099,19 +17041,78 @@
               <a:buNone/>
             </a:pPr>
             <a:r>
-              <a:rPr lang="en" dirty="0">
-                <a:solidFill>
-                  <a:srgbClr val="444444"/>
-                </a:solidFill>
-                <a:latin typeface="Menlo Regular"/>
-                <a:ea typeface="Menlo Regular"/>
-                <a:cs typeface="Menlo Regular"/>
-                <a:sym typeface="Courier New"/>
-              </a:rPr>
-              <a:t>puts </a:t>
-            </a:r>
-            <a:r>
-              <a:rPr lang="en" dirty="0">
+              <a:rPr lang="en-US" sz="2400" dirty="0" smtClean="0"/>
+              <a:t>	from sys import </a:t>
+            </a:r>
+            <a:r>
+              <a:rPr lang="en-US" sz="2400" dirty="0" err="1" smtClean="0"/>
+              <a:t>argv</a:t>
+            </a:r>
+            <a:endParaRPr lang="en-US" sz="2400" dirty="0" smtClean="0"/>
+          </a:p>
+          <a:p>
+            <a:pPr lvl="0" rtl="0">
+              <a:spcBef>
+                <a:spcPts val="0"/>
+              </a:spcBef>
+              <a:buNone/>
+            </a:pPr>
+            <a:endParaRPr lang="en-US" sz="2400" dirty="0"/>
+          </a:p>
+          <a:p>
+            <a:pPr lvl="0" rtl="0">
+              <a:spcBef>
+                <a:spcPts val="0"/>
+              </a:spcBef>
+              <a:buNone/>
+            </a:pPr>
+            <a:r>
+              <a:rPr lang="en-US" sz="2400" dirty="0" smtClean="0"/>
+              <a:t>	script, </a:t>
+            </a:r>
+            <a:r>
+              <a:rPr lang="en-US" sz="2400" dirty="0" err="1" smtClean="0"/>
+              <a:t>u</a:t>
+            </a:r>
+            <a:r>
+              <a:rPr lang="en-US" sz="2400" dirty="0" err="1" smtClean="0"/>
+              <a:t>ser_name</a:t>
+            </a:r>
+            <a:r>
+              <a:rPr lang="en-US" sz="2400" dirty="0" smtClean="0"/>
+              <a:t> = </a:t>
+            </a:r>
+            <a:r>
+              <a:rPr lang="en-US" sz="2400" dirty="0" err="1" smtClean="0"/>
+              <a:t>argv</a:t>
+            </a:r>
+            <a:endParaRPr lang="en-US" sz="2400" dirty="0" smtClean="0"/>
+          </a:p>
+          <a:p>
+            <a:pPr lvl="0" rtl="0">
+              <a:spcBef>
+                <a:spcPts val="0"/>
+              </a:spcBef>
+              <a:buNone/>
+            </a:pPr>
+            <a:endParaRPr lang="en-US" sz="2400" dirty="0"/>
+          </a:p>
+          <a:p>
+            <a:pPr lvl="0" rtl="0">
+              <a:spcBef>
+                <a:spcPts val="0"/>
+              </a:spcBef>
+              <a:buNone/>
+            </a:pPr>
+            <a:r>
+              <a:rPr lang="en-US" sz="2400" dirty="0" smtClean="0">
+                <a:ea typeface="Menlo Regular"/>
+                <a:cs typeface="Menlo Regular"/>
+              </a:rPr>
+              <a:t>	print(</a:t>
+            </a:r>
+            <a:r>
+              <a:rPr lang="en" sz="2400" dirty="0" smtClean="0">
                 <a:solidFill>
                   <a:srgbClr val="771100"/>
                 </a:solidFill>
@@ -17123,7 +17124,7 @@
               <a:t>"</a:t>
             </a:r>
             <a:r>
-              <a:rPr lang="en" dirty="0">
+              <a:rPr lang="en" sz="2400" dirty="0" smtClean="0">
                 <a:solidFill>
                   <a:srgbClr val="DD2200"/>
                 </a:solidFill>
@@ -17132,70 +17133,10 @@
                 <a:cs typeface="Menlo Regular"/>
                 <a:sym typeface="Courier New"/>
               </a:rPr>
-              <a:t>Hello, </a:t>
-            </a:r>
-            <a:r>
-              <a:rPr lang="en" b="1" dirty="0">
-                <a:solidFill>
-                  <a:srgbClr val="666666"/>
-                </a:solidFill>
-                <a:latin typeface="Menlo Regular"/>
-                <a:ea typeface="Menlo Regular"/>
-                <a:cs typeface="Menlo Regular"/>
-                <a:sym typeface="Courier New"/>
-              </a:rPr>
-              <a:t>#{</a:t>
-            </a:r>
-            <a:r>
-              <a:rPr lang="en" dirty="0">
-                <a:solidFill>
-                  <a:srgbClr val="006699"/>
-                </a:solidFill>
-                <a:latin typeface="Menlo Regular"/>
-                <a:ea typeface="Menlo Regular"/>
-                <a:cs typeface="Menlo Regular"/>
-                <a:sym typeface="Courier New"/>
-              </a:rPr>
-              <a:t>ARGV</a:t>
-            </a:r>
-            <a:r>
-              <a:rPr lang="en" dirty="0">
-                <a:solidFill>
-                  <a:srgbClr val="444444"/>
-                </a:solidFill>
-                <a:latin typeface="Menlo Regular"/>
-                <a:ea typeface="Menlo Regular"/>
-                <a:cs typeface="Menlo Regular"/>
-                <a:sym typeface="Courier New"/>
-              </a:rPr>
-              <a:t>.first</a:t>
-            </a:r>
-            <a:r>
-              <a:rPr lang="en" b="1" dirty="0">
-                <a:solidFill>
-                  <a:srgbClr val="666666"/>
-                </a:solidFill>
-                <a:latin typeface="Menlo Regular"/>
-                <a:ea typeface="Menlo Regular"/>
-                <a:cs typeface="Menlo Regular"/>
-                <a:sym typeface="Courier New"/>
-              </a:rPr>
-              <a:t>}</a:t>
-            </a:r>
-            <a:r>
-              <a:rPr lang="en" dirty="0">
-                <a:solidFill>
-                  <a:srgbClr val="DD2200"/>
-                </a:solidFill>
-                <a:latin typeface="Menlo Regular"/>
-                <a:ea typeface="Menlo Regular"/>
-                <a:cs typeface="Menlo Regular"/>
-                <a:sym typeface="Courier New"/>
-              </a:rPr>
-              <a:t>!</a:t>
-            </a:r>
-            <a:r>
-              <a:rPr lang="en" dirty="0">
+              <a:t>Hello, %s!</a:t>
+            </a:r>
+            <a:r>
+              <a:rPr lang="en" sz="2400" dirty="0" smtClean="0">
                 <a:solidFill>
                   <a:srgbClr val="771100"/>
                 </a:solidFill>
@@ -17204,8 +17145,17 @@
                 <a:cs typeface="Menlo Regular"/>
                 <a:sym typeface="Courier New"/>
               </a:rPr>
-              <a:t>"</a:t>
-            </a:r>
+              <a:t>“ % user_name)</a:t>
+            </a:r>
+            <a:endParaRPr lang="en" sz="2400" dirty="0">
+              <a:solidFill>
+                <a:srgbClr val="771100"/>
+              </a:solidFill>
+              <a:latin typeface="Menlo Regular"/>
+              <a:ea typeface="Menlo Regular"/>
+              <a:cs typeface="Menlo Regular"/>
+              <a:sym typeface="Courier New"/>
+            </a:endParaRPr>
           </a:p>
           <a:p>
             <a:pPr lvl="0" rtl="0">
@@ -17254,7 +17204,19 @@
                 <a:cs typeface="Menlo Regular"/>
                 <a:sym typeface="Courier New"/>
               </a:rPr>
-              <a:t>$ ruby hello.rb </a:t>
+              <a:t>$ </a:t>
+            </a:r>
+            <a:r>
+              <a:rPr lang="en" dirty="0" smtClean="0">
+                <a:solidFill>
+                  <a:schemeClr val="tx1"/>
+                </a:solidFill>
+                <a:latin typeface="Menlo Regular"/>
+                <a:ea typeface="Menlo Regular"/>
+                <a:cs typeface="Menlo Regular"/>
+                <a:sym typeface="Courier New"/>
+              </a:rPr>
+              <a:t>python hello.py </a:t>
             </a:r>
             <a:r>
               <a:rPr lang="en-US" dirty="0" smtClean="0">
@@ -17453,7 +17415,7 @@
                 <a:latin typeface="Menlo Regular"/>
                 <a:cs typeface="Menlo Regular"/>
               </a:rPr>
-              <a:t>hello.rb</a:t>
+              <a:t>hello.py</a:t>
             </a:r>
             <a:endParaRPr lang="en-US" dirty="0" smtClean="0">
               <a:solidFill>
@@ -19313,14 +19275,11 @@
           </a:bodyPr>
           <a:lstStyle/>
           <a:p>
-            <a:pPr lvl="0" rtl="0">
-              <a:spcBef>
-                <a:spcPts val="0"/>
-              </a:spcBef>
-              <a:buNone/>
-            </a:pPr>
-            <a:r>
-              <a:rPr lang="en" sz="1800" dirty="0">
+            <a:pPr lvl="0">
+              <a:buNone/>
+            </a:pPr>
+            <a:r>
+              <a:rPr lang="en-US" sz="1800" dirty="0">
                 <a:solidFill>
                   <a:srgbClr val="000000"/>
                 </a:solidFill>
@@ -19329,18 +19288,10 @@
                 <a:cs typeface="Menlo Regular"/>
                 <a:sym typeface="Courier New"/>
               </a:rPr>
-              <a:t>authors = {</a:t>
-            </a:r>
-          </a:p>
-          <a:p>
-            <a:pPr lvl="0" rtl="0">
-              <a:spcBef>
-                <a:spcPts val="0"/>
-              </a:spcBef>
-              <a:buNone/>
-            </a:pPr>
-            <a:r>
-              <a:rPr lang="en" sz="1800" dirty="0">
+              <a:t>authors = </a:t>
+            </a:r>
+            <a:r>
+              <a:rPr lang="en-US" sz="1800" dirty="0" smtClean="0">
                 <a:solidFill>
                   <a:srgbClr val="000000"/>
                 </a:solidFill>
@@ -19349,10 +19300,27 @@
                 <a:cs typeface="Menlo Regular"/>
                 <a:sym typeface="Courier New"/>
               </a:rPr>
-              <a:t>    </a:t>
-            </a:r>
-            <a:r>
-              <a:rPr lang="en" sz="1800" dirty="0">
+              <a:t>{</a:t>
+            </a:r>
+          </a:p>
+          <a:p>
+            <a:pPr lvl="0">
+              <a:buNone/>
+            </a:pPr>
+            <a:r>
+              <a:rPr lang="en-US" sz="1800" dirty="0">
+                <a:solidFill>
+                  <a:srgbClr val="000000"/>
+                </a:solidFill>
+                <a:latin typeface="Menlo Regular"/>
+                <a:ea typeface="Menlo Regular"/>
+                <a:cs typeface="Menlo Regular"/>
+                <a:sym typeface="Courier New"/>
+              </a:rPr>
+              <a:t>	</a:t>
+            </a:r>
+            <a:r>
+              <a:rPr lang="en-US" sz="1800" dirty="0" smtClean="0">
                 <a:solidFill>
                   <a:srgbClr val="FF0000"/>
                 </a:solidFill>
@@ -19361,10 +19329,34 @@
                 <a:cs typeface="Menlo Regular"/>
                 <a:sym typeface="Courier New"/>
               </a:rPr>
-              <a:t>"Charles Dickens" </a:t>
-            </a:r>
-            <a:r>
-              <a:rPr lang="en" sz="1800" dirty="0">
+              <a:t>"</a:t>
+            </a:r>
+            <a:r>
+              <a:rPr lang="en-US" sz="1800" dirty="0">
+                <a:solidFill>
+                  <a:srgbClr val="FF0000"/>
+                </a:solidFill>
+                <a:latin typeface="Menlo Regular"/>
+                <a:ea typeface="Menlo Regular"/>
+                <a:cs typeface="Menlo Regular"/>
+                <a:sym typeface="Courier New"/>
+              </a:rPr>
+              <a:t>Charles </a:t>
+            </a:r>
+            <a:r>
+              <a:rPr lang="en-US" sz="1800" dirty="0" smtClean="0">
+                <a:solidFill>
+                  <a:srgbClr val="FF0000"/>
+                </a:solidFill>
+                <a:latin typeface="Menlo Regular"/>
+                <a:ea typeface="Menlo Regular"/>
+                <a:cs typeface="Menlo Regular"/>
+                <a:sym typeface="Courier New"/>
+              </a:rPr>
+              <a:t>Dickens”</a:t>
+            </a:r>
+            <a:r>
+              <a:rPr lang="en-US" sz="1800" dirty="0" smtClean="0">
                 <a:solidFill>
                   <a:srgbClr val="000000"/>
                 </a:solidFill>
@@ -19373,10 +19365,10 @@
                 <a:cs typeface="Menlo Regular"/>
                 <a:sym typeface="Courier New"/>
               </a:rPr>
-              <a:t>=&gt; </a:t>
-            </a:r>
-            <a:r>
-              <a:rPr lang="en" sz="1800" dirty="0">
+              <a:t>: </a:t>
+            </a:r>
+            <a:r>
+              <a:rPr lang="en-US" sz="1800" dirty="0">
                 <a:solidFill>
                   <a:srgbClr val="FF0000"/>
                 </a:solidFill>
@@ -19388,7 +19380,7 @@
               <a:t>"1870"</a:t>
             </a:r>
             <a:r>
-              <a:rPr lang="en" sz="1800" dirty="0">
+              <a:rPr lang="en-US" sz="1800" dirty="0">
                 <a:solidFill>
                   <a:srgbClr val="000000"/>
                 </a:solidFill>
@@ -19397,229 +19389,9 @@
                 <a:cs typeface="Menlo Regular"/>
                 <a:sym typeface="Courier New"/>
               </a:rPr>
-              <a:t>,</a:t>
-            </a:r>
-          </a:p>
-          <a:p>
-            <a:pPr lvl="0" rtl="0">
-              <a:spcBef>
-                <a:spcPts val="0"/>
-              </a:spcBef>
-              <a:buNone/>
-            </a:pPr>
-            <a:r>
-              <a:rPr lang="en" sz="1800" dirty="0">
-                <a:solidFill>
-                  <a:srgbClr val="000000"/>
-                </a:solidFill>
-                <a:latin typeface="Menlo Regular"/>
-                <a:ea typeface="Menlo Regular"/>
-                <a:cs typeface="Menlo Regular"/>
-                <a:sym typeface="Courier New"/>
-              </a:rPr>
-              <a:t>    </a:t>
-            </a:r>
-            <a:r>
-              <a:rPr lang="en" sz="1800" dirty="0">
-                <a:solidFill>
-                  <a:srgbClr val="FF0000"/>
-                </a:solidFill>
-                <a:latin typeface="Menlo Regular"/>
-                <a:ea typeface="Menlo Regular"/>
-                <a:cs typeface="Menlo Regular"/>
-                <a:sym typeface="Courier New"/>
-              </a:rPr>
-              <a:t>"William Thackeray" </a:t>
-            </a:r>
-            <a:r>
-              <a:rPr lang="en" sz="1800" dirty="0">
-                <a:solidFill>
-                  <a:srgbClr val="000000"/>
-                </a:solidFill>
-                <a:latin typeface="Menlo Regular"/>
-                <a:ea typeface="Menlo Regular"/>
-                <a:cs typeface="Menlo Regular"/>
-                <a:sym typeface="Courier New"/>
-              </a:rPr>
-              <a:t>=&gt; </a:t>
-            </a:r>
-            <a:r>
-              <a:rPr lang="en" sz="1800" dirty="0">
-                <a:solidFill>
-                  <a:srgbClr val="FF0000"/>
-                </a:solidFill>
-                <a:latin typeface="Menlo Regular"/>
-                <a:ea typeface="Menlo Regular"/>
-                <a:cs typeface="Menlo Regular"/>
-                <a:sym typeface="Courier New"/>
-              </a:rPr>
-              <a:t>"1863"</a:t>
-            </a:r>
-            <a:r>
-              <a:rPr lang="en" sz="1800" dirty="0">
-                <a:solidFill>
-                  <a:srgbClr val="000000"/>
-                </a:solidFill>
-                <a:latin typeface="Menlo Regular"/>
-                <a:ea typeface="Menlo Regular"/>
-                <a:cs typeface="Menlo Regular"/>
-                <a:sym typeface="Courier New"/>
-              </a:rPr>
-              <a:t>,</a:t>
-            </a:r>
-          </a:p>
-          <a:p>
-            <a:pPr lvl="0" rtl="0">
-              <a:spcBef>
-                <a:spcPts val="0"/>
-              </a:spcBef>
-              <a:buNone/>
-            </a:pPr>
-            <a:r>
-              <a:rPr lang="en" sz="1800" dirty="0">
-                <a:solidFill>
-                  <a:srgbClr val="000000"/>
-                </a:solidFill>
-                <a:latin typeface="Menlo Regular"/>
-                <a:ea typeface="Menlo Regular"/>
-                <a:cs typeface="Menlo Regular"/>
-                <a:sym typeface="Courier New"/>
-              </a:rPr>
-              <a:t>    </a:t>
-            </a:r>
-            <a:r>
-              <a:rPr lang="en" sz="1800" dirty="0">
-                <a:solidFill>
-                  <a:srgbClr val="FF0000"/>
-                </a:solidFill>
-                <a:latin typeface="Menlo Regular"/>
-                <a:ea typeface="Menlo Regular"/>
-                <a:cs typeface="Menlo Regular"/>
-                <a:sym typeface="Courier New"/>
-              </a:rPr>
-              <a:t>"Anthony Trollope" </a:t>
-            </a:r>
-            <a:r>
-              <a:rPr lang="en" sz="1800" dirty="0">
-                <a:solidFill>
-                  <a:srgbClr val="000000"/>
-                </a:solidFill>
-                <a:latin typeface="Menlo Regular"/>
-                <a:ea typeface="Menlo Regular"/>
-                <a:cs typeface="Menlo Regular"/>
-                <a:sym typeface="Courier New"/>
-              </a:rPr>
-              <a:t>=&gt; </a:t>
-            </a:r>
-            <a:r>
-              <a:rPr lang="en" sz="1800" dirty="0">
-                <a:solidFill>
-                  <a:srgbClr val="FF0000"/>
-                </a:solidFill>
-                <a:latin typeface="Menlo Regular"/>
-                <a:ea typeface="Menlo Regular"/>
-                <a:cs typeface="Menlo Regular"/>
-                <a:sym typeface="Courier New"/>
-              </a:rPr>
-              <a:t>"1882"</a:t>
-            </a:r>
-            <a:r>
-              <a:rPr lang="en" sz="1800" dirty="0">
-                <a:solidFill>
-                  <a:srgbClr val="000000"/>
-                </a:solidFill>
-                <a:latin typeface="Menlo Regular"/>
-                <a:ea typeface="Menlo Regular"/>
-                <a:cs typeface="Menlo Regular"/>
-                <a:sym typeface="Courier New"/>
-              </a:rPr>
-              <a:t>,</a:t>
-            </a:r>
-          </a:p>
-          <a:p>
-            <a:pPr lvl="0" rtl="0">
-              <a:spcBef>
-                <a:spcPts val="0"/>
-              </a:spcBef>
-              <a:buNone/>
-            </a:pPr>
-            <a:r>
-              <a:rPr lang="en" sz="1800" dirty="0">
-                <a:solidFill>
-                  <a:srgbClr val="000000"/>
-                </a:solidFill>
-                <a:latin typeface="Menlo Regular"/>
-                <a:ea typeface="Menlo Regular"/>
-                <a:cs typeface="Menlo Regular"/>
-                <a:sym typeface="Courier New"/>
-              </a:rPr>
-              <a:t>    </a:t>
-            </a:r>
-            <a:r>
-              <a:rPr lang="en" sz="1800" dirty="0">
-                <a:solidFill>
-                  <a:srgbClr val="FF0000"/>
-                </a:solidFill>
-                <a:latin typeface="Menlo Regular"/>
-                <a:ea typeface="Menlo Regular"/>
-                <a:cs typeface="Menlo Regular"/>
-                <a:sym typeface="Courier New"/>
-              </a:rPr>
-              <a:t>"Gerard Manley Hopkins"</a:t>
-            </a:r>
-            <a:r>
-              <a:rPr lang="en" sz="1800" dirty="0">
-                <a:solidFill>
-                  <a:srgbClr val="000000"/>
-                </a:solidFill>
-                <a:latin typeface="Menlo Regular"/>
-                <a:ea typeface="Menlo Regular"/>
-                <a:cs typeface="Menlo Regular"/>
-                <a:sym typeface="Courier New"/>
-              </a:rPr>
-              <a:t> =&gt; </a:t>
-            </a:r>
-            <a:r>
-              <a:rPr lang="en" sz="1800" dirty="0">
-                <a:solidFill>
-                  <a:srgbClr val="FF0000"/>
-                </a:solidFill>
-                <a:latin typeface="Menlo Regular"/>
-                <a:ea typeface="Menlo Regular"/>
-                <a:cs typeface="Menlo Regular"/>
-                <a:sym typeface="Courier New"/>
-              </a:rPr>
-              <a:t>"1889"</a:t>
-            </a:r>
-          </a:p>
-          <a:p>
-            <a:pPr lvl="0" rtl="0">
-              <a:spcBef>
-                <a:spcPts val="0"/>
-              </a:spcBef>
-              <a:buNone/>
-            </a:pPr>
-            <a:r>
-              <a:rPr lang="en" sz="1800" dirty="0">
-                <a:solidFill>
-                  <a:srgbClr val="000000"/>
-                </a:solidFill>
-                <a:latin typeface="Menlo Regular"/>
-                <a:ea typeface="Menlo Regular"/>
-                <a:cs typeface="Menlo Regular"/>
-                <a:sym typeface="Courier New"/>
-              </a:rPr>
-              <a:t>}</a:t>
-            </a:r>
-          </a:p>
-          <a:p>
-            <a:pPr lvl="0" rtl="0">
-              <a:spcBef>
-                <a:spcPts val="0"/>
-              </a:spcBef>
-              <a:buNone/>
-            </a:pPr>
-            <a:endParaRPr sz="1800" dirty="0">
+              <a:t>,    </a:t>
+            </a:r>
+            <a:endParaRPr lang="en-US" sz="1800" dirty="0" smtClean="0">
               <a:solidFill>
                 <a:srgbClr val="000000"/>
               </a:solidFill>
@@ -19630,14 +19402,11 @@
             </a:endParaRPr>
           </a:p>
           <a:p>
-            <a:pPr lvl="0" rtl="0">
-              <a:spcBef>
-                <a:spcPts val="0"/>
-              </a:spcBef>
-              <a:buNone/>
-            </a:pPr>
-            <a:r>
-              <a:rPr lang="en" sz="1800" dirty="0">
+            <a:pPr lvl="0">
+              <a:buNone/>
+            </a:pPr>
+            <a:r>
+              <a:rPr lang="en-US" sz="1800" dirty="0">
                 <a:solidFill>
                   <a:srgbClr val="000000"/>
                 </a:solidFill>
@@ -19646,18 +19415,46 @@
                 <a:cs typeface="Menlo Regular"/>
                 <a:sym typeface="Courier New"/>
               </a:rPr>
-              <a:t>authors.each do |author, year|</a:t>
-            </a:r>
-          </a:p>
-          <a:p>
-            <a:pPr lvl="0" rtl="0">
-              <a:spcBef>
-                <a:spcPts val="0"/>
-              </a:spcBef>
-              <a:buNone/>
-            </a:pPr>
-            <a:r>
-              <a:rPr lang="en" sz="1800" dirty="0">
+              <a:t>	</a:t>
+            </a:r>
+            <a:r>
+              <a:rPr lang="en-US" sz="1800" dirty="0" smtClean="0">
+                <a:solidFill>
+                  <a:srgbClr val="FF0000"/>
+                </a:solidFill>
+                <a:latin typeface="Menlo Regular"/>
+                <a:ea typeface="Menlo Regular"/>
+                <a:cs typeface="Menlo Regular"/>
+                <a:sym typeface="Courier New"/>
+              </a:rPr>
+              <a:t>"</a:t>
+            </a:r>
+            <a:r>
+              <a:rPr lang="en-US" sz="1800" dirty="0">
+                <a:solidFill>
+                  <a:srgbClr val="FF0000"/>
+                </a:solidFill>
+                <a:latin typeface="Menlo Regular"/>
+                <a:ea typeface="Menlo Regular"/>
+                <a:cs typeface="Menlo Regular"/>
+                <a:sym typeface="Courier New"/>
+              </a:rPr>
+              <a:t>William </a:t>
+            </a:r>
+            <a:r>
+              <a:rPr lang="en-US" sz="1800" dirty="0" smtClean="0">
+                <a:solidFill>
+                  <a:srgbClr val="FF0000"/>
+                </a:solidFill>
+                <a:latin typeface="Menlo Regular"/>
+                <a:ea typeface="Menlo Regular"/>
+                <a:cs typeface="Menlo Regular"/>
+                <a:sym typeface="Courier New"/>
+              </a:rPr>
+              <a:t>Thackeray”</a:t>
+            </a:r>
+            <a:r>
+              <a:rPr lang="en-US" sz="1800" dirty="0" smtClean="0">
                 <a:solidFill>
                   <a:srgbClr val="000000"/>
                 </a:solidFill>
@@ -19666,22 +19463,22 @@
                 <a:cs typeface="Menlo Regular"/>
                 <a:sym typeface="Courier New"/>
               </a:rPr>
-              <a:t>  </a:t>
-            </a:r>
-            <a:r>
-              <a:rPr lang="en" sz="1800" dirty="0">
-                <a:solidFill>
-                  <a:srgbClr val="0B5C92"/>
-                </a:solidFill>
-                <a:latin typeface="Menlo Regular"/>
-                <a:ea typeface="Menlo Regular"/>
-                <a:cs typeface="Menlo Regular"/>
-                <a:sym typeface="Courier New"/>
-              </a:rPr>
-              <a:t>puts</a:t>
-            </a:r>
-            <a:r>
-              <a:rPr lang="en" sz="1800" dirty="0">
+              <a:t>: </a:t>
+            </a:r>
+            <a:r>
+              <a:rPr lang="en-US" sz="1800" dirty="0">
+                <a:solidFill>
+                  <a:srgbClr val="FF0000"/>
+                </a:solidFill>
+                <a:latin typeface="Menlo Regular"/>
+                <a:ea typeface="Menlo Regular"/>
+                <a:cs typeface="Menlo Regular"/>
+                <a:sym typeface="Courier New"/>
+              </a:rPr>
+              <a:t>"1863"</a:t>
+            </a:r>
+            <a:r>
+              <a:rPr lang="en-US" sz="1800" dirty="0">
                 <a:solidFill>
                   <a:srgbClr val="000000"/>
                 </a:solidFill>
@@ -19690,10 +19487,27 @@
                 <a:cs typeface="Menlo Regular"/>
                 <a:sym typeface="Courier New"/>
               </a:rPr>
-              <a:t> author.to_s + </a:t>
-            </a:r>
-            <a:r>
-              <a:rPr lang="en" sz="1800" dirty="0">
+              <a:t>,    </a:t>
+            </a:r>
+          </a:p>
+          <a:p>
+            <a:pPr lvl="0">
+              <a:buNone/>
+            </a:pPr>
+            <a:r>
+              <a:rPr lang="en-US" sz="1800" dirty="0" smtClean="0">
+                <a:solidFill>
+                  <a:srgbClr val="000000"/>
+                </a:solidFill>
+                <a:latin typeface="Menlo Regular"/>
+                <a:ea typeface="Menlo Regular"/>
+                <a:cs typeface="Menlo Regular"/>
+                <a:sym typeface="Courier New"/>
+              </a:rPr>
+              <a:t>	</a:t>
+            </a:r>
+            <a:r>
+              <a:rPr lang="en-US" sz="1800" dirty="0" smtClean="0">
                 <a:solidFill>
                   <a:srgbClr val="FF0000"/>
                 </a:solidFill>
@@ -19702,10 +19516,34 @@
                 <a:cs typeface="Menlo Regular"/>
                 <a:sym typeface="Courier New"/>
               </a:rPr>
-              <a:t>" kicked the bucket in "</a:t>
-            </a:r>
-            <a:r>
-              <a:rPr lang="en" sz="1800" dirty="0">
+              <a:t>"</a:t>
+            </a:r>
+            <a:r>
+              <a:rPr lang="en-US" sz="1800" dirty="0">
+                <a:solidFill>
+                  <a:srgbClr val="FF0000"/>
+                </a:solidFill>
+                <a:latin typeface="Menlo Regular"/>
+                <a:ea typeface="Menlo Regular"/>
+                <a:cs typeface="Menlo Regular"/>
+                <a:sym typeface="Courier New"/>
+              </a:rPr>
+              <a:t>Anthony </a:t>
+            </a:r>
+            <a:r>
+              <a:rPr lang="en-US" sz="1800" dirty="0" smtClean="0">
+                <a:solidFill>
+                  <a:srgbClr val="FF0000"/>
+                </a:solidFill>
+                <a:latin typeface="Menlo Regular"/>
+                <a:ea typeface="Menlo Regular"/>
+                <a:cs typeface="Menlo Regular"/>
+                <a:sym typeface="Courier New"/>
+              </a:rPr>
+              <a:t>Trollope”</a:t>
+            </a:r>
+            <a:r>
+              <a:rPr lang="en-US" sz="1800" dirty="0">
                 <a:solidFill>
                   <a:srgbClr val="000000"/>
                 </a:solidFill>
@@ -19714,18 +19552,10 @@
                 <a:cs typeface="Menlo Regular"/>
                 <a:sym typeface="Courier New"/>
               </a:rPr>
-              <a:t> + year.to_s</a:t>
-            </a:r>
-          </a:p>
-          <a:p>
-            <a:pPr lvl="0" rtl="0">
-              <a:spcBef>
-                <a:spcPts val="0"/>
-              </a:spcBef>
-              <a:buNone/>
-            </a:pPr>
-            <a:r>
-              <a:rPr lang="en" sz="1800" dirty="0">
+              <a:t>:</a:t>
+            </a:r>
+            <a:r>
+              <a:rPr lang="en-US" sz="1800" dirty="0" smtClean="0">
                 <a:solidFill>
                   <a:srgbClr val="000000"/>
                 </a:solidFill>
@@ -19734,17 +19564,36 @@
                 <a:cs typeface="Menlo Regular"/>
                 <a:sym typeface="Courier New"/>
               </a:rPr>
-              <a:t>end</a:t>
-            </a:r>
-          </a:p>
-          <a:p>
-            <a:pPr lvl="0" rtl="0">
-              <a:spcBef>
-                <a:spcPts val="0"/>
-              </a:spcBef>
-              <a:buNone/>
-            </a:pPr>
-            <a:endParaRPr sz="1800" dirty="0">
+              <a:t> </a:t>
+            </a:r>
+            <a:r>
+              <a:rPr lang="en-US" sz="1800" dirty="0">
+                <a:solidFill>
+                  <a:srgbClr val="FF0000"/>
+                </a:solidFill>
+                <a:latin typeface="Menlo Regular"/>
+                <a:ea typeface="Menlo Regular"/>
+                <a:cs typeface="Menlo Regular"/>
+                <a:sym typeface="Courier New"/>
+              </a:rPr>
+              <a:t>"1882"</a:t>
+            </a:r>
+            <a:r>
+              <a:rPr lang="en-US" sz="1800" dirty="0">
+                <a:solidFill>
+                  <a:srgbClr val="000000"/>
+                </a:solidFill>
+                <a:latin typeface="Menlo Regular"/>
+                <a:ea typeface="Menlo Regular"/>
+                <a:cs typeface="Menlo Regular"/>
+                <a:sym typeface="Courier New"/>
+              </a:rPr>
+              <a:t>,    </a:t>
+            </a:r>
+            <a:endParaRPr lang="en-US" sz="1800" dirty="0" smtClean="0">
+              <a:solidFill>
+                <a:srgbClr val="000000"/>
+              </a:solidFill>
               <a:latin typeface="Menlo Regular"/>
               <a:ea typeface="Menlo Regular"/>
               <a:cs typeface="Menlo Regular"/>
@@ -19752,21 +19601,335 @@
             </a:endParaRPr>
           </a:p>
           <a:p>
-            <a:pPr>
-              <a:spcBef>
-                <a:spcPts val="0"/>
-              </a:spcBef>
-              <a:buNone/>
-            </a:pPr>
-            <a:r>
-              <a:rPr lang="en" sz="2400" dirty="0">
-                <a:latin typeface="Open Sans"/>
-                <a:ea typeface="Open Sans"/>
-                <a:cs typeface="Open Sans"/>
-                <a:sym typeface="Open Sans"/>
-              </a:rPr>
-              <a:t>Can you write this as a method?</a:t>
-            </a:r>
+            <a:pPr lvl="0">
+              <a:buNone/>
+            </a:pPr>
+            <a:r>
+              <a:rPr lang="en-US" sz="1800" dirty="0">
+                <a:solidFill>
+                  <a:srgbClr val="000000"/>
+                </a:solidFill>
+                <a:latin typeface="Menlo Regular"/>
+                <a:ea typeface="Menlo Regular"/>
+                <a:cs typeface="Menlo Regular"/>
+                <a:sym typeface="Courier New"/>
+              </a:rPr>
+              <a:t>	</a:t>
+            </a:r>
+            <a:r>
+              <a:rPr lang="en-US" sz="1800" dirty="0" smtClean="0">
+                <a:solidFill>
+                  <a:srgbClr val="FF0000"/>
+                </a:solidFill>
+                <a:latin typeface="Menlo Regular"/>
+                <a:ea typeface="Menlo Regular"/>
+                <a:cs typeface="Menlo Regular"/>
+                <a:sym typeface="Courier New"/>
+              </a:rPr>
+              <a:t>"</a:t>
+            </a:r>
+            <a:r>
+              <a:rPr lang="en-US" sz="1800" dirty="0">
+                <a:solidFill>
+                  <a:srgbClr val="FF0000"/>
+                </a:solidFill>
+                <a:latin typeface="Menlo Regular"/>
+                <a:ea typeface="Menlo Regular"/>
+                <a:cs typeface="Menlo Regular"/>
+                <a:sym typeface="Courier New"/>
+              </a:rPr>
+              <a:t>Gerard Manley </a:t>
+            </a:r>
+            <a:r>
+              <a:rPr lang="en-US" sz="1800" dirty="0" smtClean="0">
+                <a:solidFill>
+                  <a:srgbClr val="FF0000"/>
+                </a:solidFill>
+                <a:latin typeface="Menlo Regular"/>
+                <a:ea typeface="Menlo Regular"/>
+                <a:cs typeface="Menlo Regular"/>
+                <a:sym typeface="Courier New"/>
+              </a:rPr>
+              <a:t>Hopkins”</a:t>
+            </a:r>
+            <a:r>
+              <a:rPr lang="en-US" sz="1800" dirty="0" smtClean="0">
+                <a:solidFill>
+                  <a:srgbClr val="000000"/>
+                </a:solidFill>
+                <a:latin typeface="Menlo Regular"/>
+                <a:ea typeface="Menlo Regular"/>
+                <a:cs typeface="Menlo Regular"/>
+                <a:sym typeface="Courier New"/>
+              </a:rPr>
+              <a:t>: </a:t>
+            </a:r>
+            <a:r>
+              <a:rPr lang="en-US" sz="1800" dirty="0">
+                <a:solidFill>
+                  <a:srgbClr val="FF0000"/>
+                </a:solidFill>
+                <a:latin typeface="Menlo Regular"/>
+                <a:ea typeface="Menlo Regular"/>
+                <a:cs typeface="Menlo Regular"/>
+                <a:sym typeface="Courier New"/>
+              </a:rPr>
+              <a:t>"</a:t>
+            </a:r>
+            <a:r>
+              <a:rPr lang="en-US" sz="1800" dirty="0" smtClean="0">
+                <a:solidFill>
+                  <a:srgbClr val="FF0000"/>
+                </a:solidFill>
+                <a:latin typeface="Menlo Regular"/>
+                <a:ea typeface="Menlo Regular"/>
+                <a:cs typeface="Menlo Regular"/>
+                <a:sym typeface="Courier New"/>
+              </a:rPr>
+              <a:t>1889“</a:t>
+            </a:r>
+          </a:p>
+          <a:p>
+            <a:pPr lvl="0">
+              <a:buNone/>
+            </a:pPr>
+            <a:r>
+              <a:rPr lang="en-US" sz="1800" dirty="0" smtClean="0">
+                <a:solidFill>
+                  <a:srgbClr val="000000"/>
+                </a:solidFill>
+                <a:latin typeface="Menlo Regular"/>
+                <a:ea typeface="Menlo Regular"/>
+                <a:cs typeface="Menlo Regular"/>
+                <a:sym typeface="Courier New"/>
+              </a:rPr>
+              <a:t>}</a:t>
+            </a:r>
+          </a:p>
+          <a:p>
+            <a:pPr lvl="0">
+              <a:buNone/>
+            </a:pPr>
+            <a:endParaRPr lang="en-US" sz="1800" dirty="0">
+              <a:solidFill>
+                <a:srgbClr val="000000"/>
+              </a:solidFill>
+              <a:latin typeface="Menlo Regular"/>
+              <a:ea typeface="Menlo Regular"/>
+              <a:cs typeface="Menlo Regular"/>
+              <a:sym typeface="Courier New"/>
+            </a:endParaRPr>
+          </a:p>
+          <a:p>
+            <a:pPr lvl="0">
+              <a:buNone/>
+            </a:pPr>
+            <a:r>
+              <a:rPr lang="en-US" sz="1800" dirty="0" smtClean="0">
+                <a:solidFill>
+                  <a:srgbClr val="000000"/>
+                </a:solidFill>
+                <a:latin typeface="Menlo Regular"/>
+                <a:ea typeface="Menlo Regular"/>
+                <a:cs typeface="Menlo Regular"/>
+                <a:sym typeface="Courier New"/>
+              </a:rPr>
+              <a:t>for </a:t>
+            </a:r>
+            <a:r>
+              <a:rPr lang="en-US" sz="1800" dirty="0">
+                <a:solidFill>
+                  <a:srgbClr val="000000"/>
+                </a:solidFill>
+                <a:latin typeface="Menlo Regular"/>
+                <a:ea typeface="Menlo Regular"/>
+                <a:cs typeface="Menlo Regular"/>
+                <a:sym typeface="Courier New"/>
+              </a:rPr>
+              <a:t>author, date in </a:t>
+            </a:r>
+            <a:r>
+              <a:rPr lang="en-US" sz="1800" dirty="0" err="1">
+                <a:solidFill>
+                  <a:srgbClr val="000000"/>
+                </a:solidFill>
+                <a:latin typeface="Menlo Regular"/>
+                <a:ea typeface="Menlo Regular"/>
+                <a:cs typeface="Menlo Regular"/>
+                <a:sym typeface="Courier New"/>
+              </a:rPr>
+              <a:t>authors.items</a:t>
+            </a:r>
+            <a:r>
+              <a:rPr lang="en-US" sz="1800" dirty="0" smtClean="0">
+                <a:solidFill>
+                  <a:srgbClr val="000000"/>
+                </a:solidFill>
+                <a:latin typeface="Menlo Regular"/>
+                <a:ea typeface="Menlo Regular"/>
+                <a:cs typeface="Menlo Regular"/>
+                <a:sym typeface="Courier New"/>
+              </a:rPr>
+              <a:t>():</a:t>
+            </a:r>
+          </a:p>
+          <a:p>
+            <a:pPr lvl="0">
+              <a:buNone/>
+            </a:pPr>
+            <a:r>
+              <a:rPr lang="en-US" sz="1800" dirty="0">
+                <a:solidFill>
+                  <a:srgbClr val="000000"/>
+                </a:solidFill>
+                <a:latin typeface="Menlo Regular"/>
+                <a:ea typeface="Menlo Regular"/>
+                <a:cs typeface="Menlo Regular"/>
+                <a:sym typeface="Courier New"/>
+              </a:rPr>
+              <a:t>	</a:t>
+            </a:r>
+            <a:r>
+              <a:rPr lang="en-US" sz="1800" dirty="0" smtClean="0">
+                <a:solidFill>
+                  <a:srgbClr val="000000"/>
+                </a:solidFill>
+                <a:latin typeface="Menlo Regular"/>
+                <a:ea typeface="Menlo Regular"/>
+                <a:cs typeface="Menlo Regular"/>
+                <a:sym typeface="Courier New"/>
+              </a:rPr>
+              <a:t>print(</a:t>
+            </a:r>
+            <a:r>
+              <a:rPr lang="en-US" sz="1800" dirty="0" smtClean="0">
+                <a:solidFill>
+                  <a:srgbClr val="FF0000"/>
+                </a:solidFill>
+                <a:latin typeface="Menlo Regular"/>
+                <a:ea typeface="Menlo Regular"/>
+                <a:cs typeface="Menlo Regular"/>
+                <a:sym typeface="Courier New"/>
+              </a:rPr>
+              <a:t>"%</a:t>
+            </a:r>
+            <a:r>
+              <a:rPr lang="en-US" sz="1800" dirty="0">
+                <a:solidFill>
+                  <a:srgbClr val="FF0000"/>
+                </a:solidFill>
+                <a:latin typeface="Menlo Regular"/>
+                <a:ea typeface="Menlo Regular"/>
+                <a:cs typeface="Menlo Regular"/>
+                <a:sym typeface="Courier New"/>
+              </a:rPr>
+              <a:t>s" </a:t>
+            </a:r>
+            <a:r>
+              <a:rPr lang="en-US" sz="1800" dirty="0">
+                <a:solidFill>
+                  <a:srgbClr val="000000"/>
+                </a:solidFill>
+                <a:latin typeface="Menlo Regular"/>
+                <a:ea typeface="Menlo Regular"/>
+                <a:cs typeface="Menlo Regular"/>
+                <a:sym typeface="Courier New"/>
+              </a:rPr>
+              <a:t>% author + </a:t>
+            </a:r>
+            <a:r>
+              <a:rPr lang="en-US" sz="1800" dirty="0">
+                <a:solidFill>
+                  <a:srgbClr val="FF0000"/>
+                </a:solidFill>
+                <a:latin typeface="Menlo Regular"/>
+                <a:ea typeface="Menlo Regular"/>
+                <a:cs typeface="Menlo Regular"/>
+                <a:sym typeface="Courier New"/>
+              </a:rPr>
+              <a:t>" </a:t>
+            </a:r>
+            <a:r>
+              <a:rPr lang="en-US" sz="1800" dirty="0" smtClean="0">
+                <a:solidFill>
+                  <a:srgbClr val="FF0000"/>
+                </a:solidFill>
+                <a:latin typeface="Menlo Regular"/>
+                <a:ea typeface="Menlo Regular"/>
+                <a:cs typeface="Menlo Regular"/>
+                <a:sym typeface="Courier New"/>
+              </a:rPr>
+              <a:t>kicked the bucket in "</a:t>
+            </a:r>
+            <a:r>
+              <a:rPr lang="en-US" sz="1800" dirty="0" smtClean="0">
+                <a:solidFill>
+                  <a:srgbClr val="000000"/>
+                </a:solidFill>
+                <a:latin typeface="Menlo Regular"/>
+                <a:ea typeface="Menlo Regular"/>
+                <a:cs typeface="Menlo Regular"/>
+                <a:sym typeface="Courier New"/>
+              </a:rPr>
+              <a:t> </a:t>
+            </a:r>
+            <a:r>
+              <a:rPr lang="en-US" sz="1800" dirty="0">
+                <a:solidFill>
+                  <a:srgbClr val="000000"/>
+                </a:solidFill>
+                <a:latin typeface="Menlo Regular"/>
+                <a:ea typeface="Menlo Regular"/>
+                <a:cs typeface="Menlo Regular"/>
+                <a:sym typeface="Courier New"/>
+              </a:rPr>
+              <a:t>+ </a:t>
+            </a:r>
+            <a:r>
+              <a:rPr lang="en-US" sz="1800" dirty="0">
+                <a:solidFill>
+                  <a:srgbClr val="FF0000"/>
+                </a:solidFill>
+                <a:latin typeface="Menlo Regular"/>
+                <a:ea typeface="Menlo Regular"/>
+                <a:cs typeface="Menlo Regular"/>
+                <a:sym typeface="Courier New"/>
+              </a:rPr>
+              <a:t>"%s." </a:t>
+            </a:r>
+            <a:r>
+              <a:rPr lang="en-US" sz="1800" dirty="0">
+                <a:solidFill>
+                  <a:srgbClr val="000000"/>
+                </a:solidFill>
+                <a:latin typeface="Menlo Regular"/>
+                <a:ea typeface="Menlo Regular"/>
+                <a:cs typeface="Menlo Regular"/>
+                <a:sym typeface="Courier New"/>
+              </a:rPr>
+              <a:t>% </a:t>
+            </a:r>
+            <a:r>
+              <a:rPr lang="en-US" sz="1800" dirty="0" smtClean="0">
+                <a:solidFill>
+                  <a:srgbClr val="000000"/>
+                </a:solidFill>
+                <a:latin typeface="Menlo Regular"/>
+                <a:ea typeface="Menlo Regular"/>
+                <a:cs typeface="Menlo Regular"/>
+                <a:sym typeface="Courier New"/>
+              </a:rPr>
+              <a:t>date)</a:t>
+            </a:r>
+            <a:endParaRPr lang="en" sz="1800" dirty="0" smtClean="0">
+              <a:solidFill>
+                <a:srgbClr val="000000"/>
+              </a:solidFill>
+              <a:latin typeface="Menlo Regular"/>
+              <a:ea typeface="Menlo Regular"/>
+              <a:cs typeface="Menlo Regular"/>
+              <a:sym typeface="Courier New"/>
+            </a:endParaRPr>
           </a:p>
         </p:txBody>
       </p:sp>
@@ -20112,79 +20275,7 @@
                 <a:cs typeface="Menlo Regular"/>
                 <a:sym typeface="Courier New"/>
               </a:rPr>
-              <a:t>[‘kiwi</a:t>
-            </a:r>
-            <a:r>
-              <a:rPr lang="en" sz="2400" dirty="0" smtClean="0">
-                <a:solidFill>
-                  <a:srgbClr val="000000"/>
-                </a:solidFill>
-                <a:latin typeface="Menlo Regular"/>
-                <a:ea typeface="Menlo Regular"/>
-                <a:cs typeface="Menlo Regular"/>
-                <a:sym typeface="Courier New"/>
-              </a:rPr>
-              <a:t>’</a:t>
-            </a:r>
-            <a:r>
-              <a:rPr lang="en" sz="2400" dirty="0" smtClean="0">
-                <a:solidFill>
-                  <a:srgbClr val="000000"/>
-                </a:solidFill>
-                <a:latin typeface="Menlo Regular"/>
-                <a:ea typeface="Menlo Regular"/>
-                <a:cs typeface="Menlo Regular"/>
-                <a:sym typeface="Courier New"/>
-              </a:rPr>
-              <a:t>, </a:t>
-            </a:r>
-            <a:r>
-              <a:rPr lang="en" sz="2400" dirty="0" smtClean="0">
-                <a:solidFill>
-                  <a:srgbClr val="000000"/>
-                </a:solidFill>
-                <a:latin typeface="Menlo Regular"/>
-                <a:ea typeface="Menlo Regular"/>
-                <a:cs typeface="Menlo Regular"/>
-                <a:sym typeface="Courier New"/>
-              </a:rPr>
-              <a:t>‘</a:t>
-            </a:r>
-            <a:r>
-              <a:rPr lang="en" sz="2400" dirty="0" smtClean="0">
-                <a:solidFill>
-                  <a:srgbClr val="000000"/>
-                </a:solidFill>
-                <a:latin typeface="Menlo Regular"/>
-                <a:ea typeface="Menlo Regular"/>
-                <a:cs typeface="Menlo Regular"/>
-                <a:sym typeface="Courier New"/>
-              </a:rPr>
-              <a:t>strawberry’, </a:t>
-            </a:r>
-            <a:r>
-              <a:rPr lang="en" sz="2400" dirty="0" smtClean="0">
-                <a:solidFill>
-                  <a:srgbClr val="000000"/>
-                </a:solidFill>
-                <a:latin typeface="Menlo Regular"/>
-                <a:ea typeface="Menlo Regular"/>
-                <a:cs typeface="Menlo Regular"/>
-                <a:sym typeface="Courier New"/>
-              </a:rPr>
-              <a:t>‘</a:t>
-            </a:r>
-            <a:r>
-              <a:rPr lang="en" sz="2400" dirty="0" smtClean="0">
-                <a:solidFill>
-                  <a:srgbClr val="000000"/>
-                </a:solidFill>
-                <a:latin typeface="Menlo Regular"/>
-                <a:ea typeface="Menlo Regular"/>
-                <a:cs typeface="Menlo Regular"/>
-                <a:sym typeface="Courier New"/>
-              </a:rPr>
-              <a:t>plum’]</a:t>
+              <a:t>[‘kiwi’, ‘strawberry’, ‘plum’]</a:t>
             </a:r>
           </a:p>
           <a:p>
@@ -20540,103 +20631,7 @@
                 <a:cs typeface="Menlo Regular"/>
                 <a:sym typeface="Courier New"/>
               </a:rPr>
-              <a:t>{‘VA</a:t>
-            </a:r>
-            <a:r>
-              <a:rPr lang="en" sz="2400" dirty="0" smtClean="0">
-                <a:solidFill>
-                  <a:srgbClr val="000000"/>
-                </a:solidFill>
-                <a:latin typeface="Menlo Regular"/>
-                <a:ea typeface="Menlo Regular"/>
-                <a:cs typeface="Menlo Regular"/>
-                <a:sym typeface="Courier New"/>
-              </a:rPr>
-              <a:t>’</a:t>
-            </a:r>
-            <a:r>
-              <a:rPr lang="en" sz="2400" dirty="0" smtClean="0">
-                <a:solidFill>
-                  <a:srgbClr val="000000"/>
-                </a:solidFill>
-                <a:latin typeface="Menlo Regular"/>
-                <a:ea typeface="Menlo Regular"/>
-                <a:cs typeface="Menlo Regular"/>
-                <a:sym typeface="Courier New"/>
-              </a:rPr>
-              <a:t>: </a:t>
-            </a:r>
-            <a:r>
-              <a:rPr lang="en" sz="2400" dirty="0" smtClean="0">
-                <a:solidFill>
-                  <a:srgbClr val="000000"/>
-                </a:solidFill>
-                <a:latin typeface="Menlo Regular"/>
-                <a:ea typeface="Menlo Regular"/>
-                <a:cs typeface="Menlo Regular"/>
-                <a:sym typeface="Courier New"/>
-              </a:rPr>
-              <a:t>‘</a:t>
-            </a:r>
-            <a:r>
-              <a:rPr lang="en" sz="2400" dirty="0" smtClean="0">
-                <a:solidFill>
-                  <a:srgbClr val="000000"/>
-                </a:solidFill>
-                <a:latin typeface="Menlo Regular"/>
-                <a:ea typeface="Menlo Regular"/>
-                <a:cs typeface="Menlo Regular"/>
-                <a:sym typeface="Courier New"/>
-              </a:rPr>
-              <a:t>Virginia’, ‘MD’: </a:t>
-            </a:r>
-            <a:r>
-              <a:rPr lang="en" sz="2400" dirty="0" smtClean="0">
-                <a:solidFill>
-                  <a:srgbClr val="000000"/>
-                </a:solidFill>
-                <a:latin typeface="Menlo Regular"/>
-                <a:ea typeface="Menlo Regular"/>
-                <a:cs typeface="Menlo Regular"/>
-                <a:sym typeface="Courier New"/>
-              </a:rPr>
-              <a:t>‘</a:t>
-            </a:r>
-            <a:r>
-              <a:rPr lang="en" sz="2400" dirty="0" smtClean="0">
-                <a:solidFill>
-                  <a:srgbClr val="000000"/>
-                </a:solidFill>
-                <a:latin typeface="Menlo Regular"/>
-                <a:ea typeface="Menlo Regular"/>
-                <a:cs typeface="Menlo Regular"/>
-                <a:sym typeface="Courier New"/>
-              </a:rPr>
-              <a:t>Maryland</a:t>
-            </a:r>
-            <a:r>
-              <a:rPr lang="en" sz="2400" dirty="0" smtClean="0">
-                <a:solidFill>
-                  <a:srgbClr val="000000"/>
-                </a:solidFill>
-                <a:latin typeface="Menlo Regular"/>
-                <a:ea typeface="Menlo Regular"/>
-                <a:cs typeface="Menlo Regular"/>
-                <a:sym typeface="Courier New"/>
-              </a:rPr>
-              <a:t>’</a:t>
-            </a:r>
-            <a:r>
-              <a:rPr lang="en" sz="2400" dirty="0" smtClean="0">
-                <a:solidFill>
-                  <a:srgbClr val="000000"/>
-                </a:solidFill>
-                <a:latin typeface="Menlo Regular"/>
-                <a:ea typeface="Menlo Regular"/>
-                <a:cs typeface="Menlo Regular"/>
-                <a:sym typeface="Courier New"/>
-              </a:rPr>
-              <a:t>}</a:t>
+              <a:t>{‘VA’: ‘Virginia’, ‘MD’: ‘Maryland’}</a:t>
             </a:r>
             <a:endParaRPr sz="2400" dirty="0">
               <a:solidFill>
@@ -20793,7 +20788,31 @@
                 <a:cs typeface="Open Sans"/>
                 <a:sym typeface="Open Sans"/>
               </a:rPr>
-              <a:t>A time traveller has suddenly appeared in the classroom!</a:t>
+              <a:t>A time </a:t>
+            </a:r>
+            <a:r>
+              <a:rPr lang="en" sz="2200" dirty="0" smtClean="0">
+                <a:solidFill>
+                  <a:srgbClr val="000000"/>
+                </a:solidFill>
+                <a:latin typeface="Open Sans"/>
+                <a:ea typeface="Open Sans"/>
+                <a:cs typeface="Open Sans"/>
+                <a:sym typeface="Open Sans"/>
+              </a:rPr>
+              <a:t>traveler </a:t>
+            </a:r>
+            <a:r>
+              <a:rPr lang="en" sz="2200" dirty="0">
+                <a:solidFill>
+                  <a:srgbClr val="000000"/>
+                </a:solidFill>
+                <a:latin typeface="Open Sans"/>
+                <a:ea typeface="Open Sans"/>
+                <a:cs typeface="Open Sans"/>
+                <a:sym typeface="Open Sans"/>
+              </a:rPr>
+              <a:t>has suddenly appeared in the classroom!</a:t>
             </a:r>
           </a:p>
           <a:p>
@@ -21040,8 +21059,150 @@
               <a:t>if year &lt; </a:t>
             </a:r>
             <a:r>
+              <a:rPr lang="en" sz="2000" dirty="0" smtClean="0">
+                <a:solidFill>
+                  <a:srgbClr val="11889C"/>
+                </a:solidFill>
+                <a:latin typeface="Menlo Regular"/>
+                <a:ea typeface="Menlo Regular"/>
+                <a:cs typeface="Menlo Regular"/>
+                <a:sym typeface="Courier New"/>
+              </a:rPr>
+              <a:t>1900:</a:t>
+            </a:r>
+            <a:endParaRPr lang="en" sz="2000" dirty="0">
+              <a:solidFill>
+                <a:srgbClr val="11889C"/>
+              </a:solidFill>
+              <a:latin typeface="Menlo Regular"/>
+              <a:ea typeface="Menlo Regular"/>
+              <a:cs typeface="Menlo Regular"/>
+              <a:sym typeface="Courier New"/>
+            </a:endParaRPr>
+          </a:p>
+          <a:p>
+            <a:pPr lvl="0" rtl="0">
+              <a:spcBef>
+                <a:spcPts val="0"/>
+              </a:spcBef>
+              <a:buNone/>
+            </a:pPr>
+            <a:r>
               <a:rPr lang="en" sz="2000" dirty="0">
                 <a:solidFill>
+                  <a:schemeClr val="tx1"/>
+                </a:solidFill>
+                <a:latin typeface="Menlo Regular"/>
+                <a:ea typeface="Menlo Regular"/>
+                <a:cs typeface="Menlo Regular"/>
+                <a:sym typeface="Courier New"/>
+              </a:rPr>
+              <a:t>  </a:t>
+            </a:r>
+            <a:r>
+              <a:rPr lang="en" sz="2000" dirty="0" smtClean="0">
+                <a:solidFill>
+                  <a:srgbClr val="0B5C92"/>
+                </a:solidFill>
+                <a:latin typeface="Menlo Regular"/>
+                <a:ea typeface="Menlo Regular"/>
+                <a:cs typeface="Menlo Regular"/>
+                <a:sym typeface="Courier New"/>
+              </a:rPr>
+              <a:t>print</a:t>
+            </a:r>
+            <a:r>
+              <a:rPr lang="en" sz="2000" dirty="0">
+                <a:solidFill>
+                  <a:schemeClr val="tx1"/>
+                </a:solidFill>
+                <a:latin typeface="Menlo Regular"/>
+                <a:ea typeface="Menlo Regular"/>
+                <a:cs typeface="Menlo Regular"/>
+                <a:sym typeface="Courier New"/>
+              </a:rPr>
+              <a:t>(</a:t>
+            </a:r>
+            <a:r>
+              <a:rPr lang="en" sz="2000" dirty="0" smtClean="0">
+                <a:solidFill>
+                  <a:srgbClr val="FF0000"/>
+                </a:solidFill>
+                <a:latin typeface="Menlo Regular"/>
+                <a:ea typeface="Menlo Regular"/>
+                <a:cs typeface="Menlo Regular"/>
+                <a:sym typeface="Courier New"/>
+              </a:rPr>
+              <a:t>"Tell </a:t>
+            </a:r>
+            <a:r>
+              <a:rPr lang="en" sz="2000" dirty="0">
+                <a:solidFill>
+                  <a:srgbClr val="FF0000"/>
+                </a:solidFill>
+                <a:latin typeface="Menlo Regular"/>
+                <a:ea typeface="Menlo Regular"/>
+                <a:cs typeface="Menlo Regular"/>
+                <a:sym typeface="Courier New"/>
+              </a:rPr>
+              <a:t>me of the past</a:t>
+            </a:r>
+            <a:r>
+              <a:rPr lang="en" sz="2000" dirty="0" smtClean="0">
+                <a:solidFill>
+                  <a:srgbClr val="FF0000"/>
+                </a:solidFill>
+                <a:latin typeface="Menlo Regular"/>
+                <a:ea typeface="Menlo Regular"/>
+                <a:cs typeface="Menlo Regular"/>
+                <a:sym typeface="Courier New"/>
+              </a:rPr>
+              <a:t>!“)</a:t>
+            </a:r>
+            <a:endParaRPr lang="en" sz="2000" dirty="0">
+              <a:solidFill>
+                <a:srgbClr val="FF0000"/>
+              </a:solidFill>
+              <a:latin typeface="Menlo Regular"/>
+              <a:ea typeface="Menlo Regular"/>
+              <a:cs typeface="Menlo Regular"/>
+              <a:sym typeface="Courier New"/>
+            </a:endParaRPr>
+          </a:p>
+          <a:p>
+            <a:pPr lvl="0" rtl="0">
+              <a:spcBef>
+                <a:spcPts val="0"/>
+              </a:spcBef>
+              <a:buNone/>
+            </a:pPr>
+            <a:r>
+              <a:rPr lang="en" sz="2000" dirty="0" smtClean="0">
+                <a:solidFill>
+                  <a:schemeClr val="tx1"/>
+                </a:solidFill>
+                <a:latin typeface="Menlo Regular"/>
+                <a:ea typeface="Menlo Regular"/>
+                <a:cs typeface="Menlo Regular"/>
+                <a:sym typeface="Courier New"/>
+              </a:rPr>
+              <a:t>elif </a:t>
+            </a:r>
+            <a:r>
+              <a:rPr lang="en" sz="2000" dirty="0">
+                <a:solidFill>
+                  <a:schemeClr val="tx1"/>
+                </a:solidFill>
+                <a:latin typeface="Menlo Regular"/>
+                <a:ea typeface="Menlo Regular"/>
+                <a:cs typeface="Menlo Regular"/>
+                <a:sym typeface="Courier New"/>
+              </a:rPr>
+              <a:t>year &gt;= </a:t>
+            </a:r>
+            <a:r>
+              <a:rPr lang="en" sz="2000" dirty="0">
+                <a:solidFill>
                   <a:srgbClr val="11889C"/>
                 </a:solidFill>
                 <a:latin typeface="Menlo Regular"/>
@@ -21051,6 +21212,75 @@
               </a:rPr>
               <a:t>1900</a:t>
             </a:r>
+            <a:r>
+              <a:rPr lang="en" sz="2000" dirty="0">
+                <a:solidFill>
+                  <a:schemeClr val="tx1"/>
+                </a:solidFill>
+                <a:latin typeface="Menlo Regular"/>
+                <a:ea typeface="Menlo Regular"/>
+                <a:cs typeface="Menlo Regular"/>
+                <a:sym typeface="Courier New"/>
+              </a:rPr>
+              <a:t> </a:t>
+            </a:r>
+            <a:r>
+              <a:rPr lang="en" sz="2000" dirty="0" smtClean="0">
+                <a:solidFill>
+                  <a:schemeClr val="tx1"/>
+                </a:solidFill>
+                <a:latin typeface="Menlo Regular"/>
+                <a:ea typeface="Menlo Regular"/>
+                <a:cs typeface="Menlo Regular"/>
+                <a:sym typeface="Courier New"/>
+              </a:rPr>
+              <a:t>and </a:t>
+            </a:r>
+            <a:r>
+              <a:rPr lang="en" sz="2000" dirty="0" smtClean="0">
+                <a:solidFill>
+                  <a:schemeClr val="tx1"/>
+                </a:solidFill>
+                <a:latin typeface="Menlo Regular"/>
+                <a:ea typeface="Menlo Regular"/>
+                <a:cs typeface="Menlo Regular"/>
+                <a:sym typeface="Courier New"/>
+              </a:rPr>
+              <a:t>year </a:t>
+            </a:r>
+            <a:r>
+              <a:rPr lang="en" sz="2000" dirty="0">
+                <a:solidFill>
+                  <a:schemeClr val="tx1"/>
+                </a:solidFill>
+                <a:latin typeface="Menlo Regular"/>
+                <a:ea typeface="Menlo Regular"/>
+                <a:cs typeface="Menlo Regular"/>
+                <a:sym typeface="Courier New"/>
+              </a:rPr>
+              <a:t>&lt;= </a:t>
+            </a:r>
+            <a:r>
+              <a:rPr lang="en" sz="2000" dirty="0" smtClean="0">
+                <a:solidFill>
+                  <a:srgbClr val="11889C"/>
+                </a:solidFill>
+                <a:latin typeface="Menlo Regular"/>
+                <a:ea typeface="Menlo Regular"/>
+                <a:cs typeface="Menlo Regular"/>
+                <a:sym typeface="Courier New"/>
+              </a:rPr>
+              <a:t>2020:</a:t>
+            </a:r>
+            <a:endParaRPr lang="en" sz="2000" dirty="0">
+              <a:solidFill>
+                <a:srgbClr val="11889C"/>
+              </a:solidFill>
+              <a:latin typeface="Menlo Regular"/>
+              <a:ea typeface="Menlo Regular"/>
+              <a:cs typeface="Menlo Regular"/>
+              <a:sym typeface="Courier New"/>
+            </a:endParaRPr>
           </a:p>
           <a:p>
             <a:pPr lvl="0" rtl="0">
@@ -21072,8 +21302,138 @@
               <a:t>  </a:t>
             </a:r>
             <a:r>
+              <a:rPr lang="en" sz="2000" dirty="0" smtClean="0">
+                <a:solidFill>
+                  <a:srgbClr val="0B5C92"/>
+                </a:solidFill>
+                <a:latin typeface="Menlo Regular"/>
+                <a:ea typeface="Menlo Regular"/>
+                <a:cs typeface="Menlo Regular"/>
+                <a:sym typeface="Courier New"/>
+              </a:rPr>
+              <a:t>print</a:t>
+            </a:r>
+            <a:r>
               <a:rPr lang="en" sz="2000" dirty="0">
                 <a:solidFill>
+                  <a:schemeClr val="tx1"/>
+                </a:solidFill>
+                <a:latin typeface="Menlo Regular"/>
+                <a:ea typeface="Menlo Regular"/>
+                <a:cs typeface="Menlo Regular"/>
+                <a:sym typeface="Courier New"/>
+              </a:rPr>
+              <a:t>(</a:t>
+            </a:r>
+            <a:r>
+              <a:rPr lang="en" sz="2000" dirty="0" smtClean="0">
+                <a:solidFill>
+                  <a:srgbClr val="FF0000"/>
+                </a:solidFill>
+                <a:latin typeface="Menlo Regular"/>
+                <a:ea typeface="Menlo Regular"/>
+                <a:cs typeface="Menlo Regular"/>
+                <a:sym typeface="Courier New"/>
+              </a:rPr>
+              <a:t>"I </a:t>
+            </a:r>
+            <a:r>
+              <a:rPr lang="en" sz="2000" dirty="0">
+                <a:solidFill>
+                  <a:srgbClr val="FF0000"/>
+                </a:solidFill>
+                <a:latin typeface="Menlo Regular"/>
+                <a:ea typeface="Menlo Regular"/>
+                <a:cs typeface="Menlo Regular"/>
+                <a:sym typeface="Courier New"/>
+              </a:rPr>
+              <a:t>wish you were from a cooler era</a:t>
+            </a:r>
+            <a:r>
+              <a:rPr lang="en" sz="2000" dirty="0" smtClean="0">
+                <a:solidFill>
+                  <a:srgbClr val="FF0000"/>
+                </a:solidFill>
+                <a:latin typeface="Menlo Regular"/>
+                <a:ea typeface="Menlo Regular"/>
+                <a:cs typeface="Menlo Regular"/>
+                <a:sym typeface="Courier New"/>
+              </a:rPr>
+              <a:t>.“)</a:t>
+            </a:r>
+            <a:endParaRPr lang="en" sz="2000" dirty="0">
+              <a:solidFill>
+                <a:srgbClr val="FF0000"/>
+              </a:solidFill>
+              <a:latin typeface="Menlo Regular"/>
+              <a:ea typeface="Menlo Regular"/>
+              <a:cs typeface="Menlo Regular"/>
+              <a:sym typeface="Courier New"/>
+            </a:endParaRPr>
+          </a:p>
+          <a:p>
+            <a:pPr lvl="0" rtl="0">
+              <a:spcBef>
+                <a:spcPts val="0"/>
+              </a:spcBef>
+              <a:buNone/>
+            </a:pPr>
+            <a:r>
+              <a:rPr lang="en-US" sz="2000" dirty="0">
+                <a:solidFill>
+                  <a:schemeClr val="tx1"/>
+                </a:solidFill>
+                <a:latin typeface="Menlo Regular"/>
+                <a:ea typeface="Menlo Regular"/>
+                <a:cs typeface="Menlo Regular"/>
+                <a:sym typeface="Courier New"/>
+              </a:rPr>
+              <a:t>e</a:t>
+            </a:r>
+            <a:r>
+              <a:rPr lang="en" sz="2000" dirty="0" smtClean="0">
+                <a:solidFill>
+                  <a:schemeClr val="tx1"/>
+                </a:solidFill>
+                <a:latin typeface="Menlo Regular"/>
+                <a:ea typeface="Menlo Regular"/>
+                <a:cs typeface="Menlo Regular"/>
+                <a:sym typeface="Courier New"/>
+              </a:rPr>
+              <a:t>lse:</a:t>
+            </a:r>
+            <a:endParaRPr lang="en" sz="2000" dirty="0">
+              <a:solidFill>
+                <a:schemeClr val="tx1"/>
+              </a:solidFill>
+              <a:latin typeface="Menlo Regular"/>
+              <a:ea typeface="Menlo Regular"/>
+              <a:cs typeface="Menlo Regular"/>
+              <a:sym typeface="Courier New"/>
+            </a:endParaRPr>
+          </a:p>
+          <a:p>
+            <a:pPr lvl="0" rtl="0">
+              <a:spcBef>
+                <a:spcPts val="0"/>
+              </a:spcBef>
+              <a:buNone/>
+            </a:pPr>
+            <a:r>
+              <a:rPr lang="en" sz="2000" dirty="0" smtClean="0">
+                <a:solidFill>
+                  <a:schemeClr val="tx1"/>
+                </a:solidFill>
+                <a:latin typeface="Menlo Regular"/>
+                <a:ea typeface="Menlo Regular"/>
+                <a:cs typeface="Menlo Regular"/>
+                <a:sym typeface="Courier New"/>
+              </a:rPr>
+              <a:t>  </a:t>
+            </a:r>
+            <a:r>
+              <a:rPr lang="en" sz="2000" dirty="0" smtClean="0">
+                <a:solidFill>
                   <a:srgbClr val="0B5C92"/>
                 </a:solidFill>
                 <a:latin typeface="Menlo Regular"/>
@@ -21081,7 +21441,7 @@
                 <a:cs typeface="Menlo Regular"/>
                 <a:sym typeface="Courier New"/>
               </a:rPr>
-              <a:t>puts</a:t>
+              <a:t>print</a:t>
             </a:r>
             <a:r>
               <a:rPr lang="en" sz="2000" dirty="0">
@@ -21093,7 +21453,19 @@
                 <a:cs typeface="Menlo Regular"/>
                 <a:sym typeface="Courier New"/>
               </a:rPr>
-              <a:t> </a:t>
+              <a:t>(</a:t>
+            </a:r>
+            <a:r>
+              <a:rPr lang="en" sz="2000" dirty="0" smtClean="0">
+                <a:solidFill>
+                  <a:srgbClr val="FF0000"/>
+                </a:solidFill>
+                <a:latin typeface="Menlo Regular"/>
+                <a:ea typeface="Menlo Regular"/>
+                <a:cs typeface="Menlo Regular"/>
+                <a:sym typeface="Courier New"/>
+              </a:rPr>
+              <a:t>"Hello</a:t>
             </a:r>
             <a:r>
               <a:rPr lang="en" sz="2000" dirty="0">
@@ -21105,8 +21477,29 @@
                 <a:cs typeface="Menlo Regular"/>
                 <a:sym typeface="Courier New"/>
               </a:rPr>
-              <a:t>"Tell me of the past!"</a:t>
-            </a:r>
+              <a:t>, future traveller</a:t>
+            </a:r>
+            <a:r>
+              <a:rPr lang="en" sz="2000" dirty="0" smtClean="0">
+                <a:solidFill>
+                  <a:srgbClr val="FF0000"/>
+                </a:solidFill>
+                <a:latin typeface="Menlo Regular"/>
+                <a:ea typeface="Menlo Regular"/>
+                <a:cs typeface="Menlo Regular"/>
+                <a:sym typeface="Courier New"/>
+              </a:rPr>
+              <a:t>.“)</a:t>
+            </a:r>
+            <a:endParaRPr lang="en" sz="2000" dirty="0">
+              <a:solidFill>
+                <a:srgbClr val="FF0000"/>
+              </a:solidFill>
+              <a:latin typeface="Menlo Regular"/>
+              <a:ea typeface="Menlo Regular"/>
+              <a:cs typeface="Menlo Regular"/>
+              <a:sym typeface="Courier New"/>
+            </a:endParaRPr>
           </a:p>
           <a:p>
             <a:pPr lvl="0" rtl="0">
@@ -21115,206 +21508,15 @@
               </a:spcBef>
               <a:buNone/>
             </a:pPr>
-            <a:r>
-              <a:rPr lang="en" sz="2000" dirty="0">
-                <a:solidFill>
-                  <a:schemeClr val="tx1"/>
-                </a:solidFill>
-                <a:latin typeface="Menlo Regular"/>
-                <a:ea typeface="Menlo Regular"/>
-                <a:cs typeface="Menlo Regular"/>
-                <a:sym typeface="Courier New"/>
-              </a:rPr>
-              <a:t>elsif year &gt;= </a:t>
-            </a:r>
-            <a:r>
-              <a:rPr lang="en" sz="2000" dirty="0">
-                <a:solidFill>
-                  <a:srgbClr val="11889C"/>
-                </a:solidFill>
-                <a:latin typeface="Menlo Regular"/>
-                <a:ea typeface="Menlo Regular"/>
-                <a:cs typeface="Menlo Regular"/>
-                <a:sym typeface="Courier New"/>
-              </a:rPr>
-              <a:t>1900</a:t>
-            </a:r>
-            <a:r>
-              <a:rPr lang="en" sz="2000" dirty="0">
-                <a:solidFill>
-                  <a:schemeClr val="tx1"/>
-                </a:solidFill>
-                <a:latin typeface="Menlo Regular"/>
-                <a:ea typeface="Menlo Regular"/>
-                <a:cs typeface="Menlo Regular"/>
-                <a:sym typeface="Courier New"/>
-              </a:rPr>
-              <a:t> &amp;&amp; year &lt;= </a:t>
-            </a:r>
-            <a:r>
-              <a:rPr lang="en" sz="2000" dirty="0">
-                <a:solidFill>
-                  <a:srgbClr val="11889C"/>
-                </a:solidFill>
-                <a:latin typeface="Menlo Regular"/>
-                <a:ea typeface="Menlo Regular"/>
-                <a:cs typeface="Menlo Regular"/>
-                <a:sym typeface="Courier New"/>
-              </a:rPr>
-              <a:t>2020</a:t>
-            </a:r>
-          </a:p>
-          <a:p>
-            <a:pPr lvl="0" rtl="0">
-              <a:spcBef>
-                <a:spcPts val="0"/>
-              </a:spcBef>
-              <a:buNone/>
-            </a:pPr>
-            <a:r>
-              <a:rPr lang="en" sz="2000" dirty="0">
-                <a:solidFill>
-                  <a:schemeClr val="tx1"/>
-                </a:solidFill>
-                <a:latin typeface="Menlo Regular"/>
-                <a:ea typeface="Menlo Regular"/>
-                <a:cs typeface="Menlo Regular"/>
-                <a:sym typeface="Courier New"/>
-              </a:rPr>
-              <a:t>  </a:t>
-            </a:r>
-            <a:r>
-              <a:rPr lang="en" sz="2000" dirty="0">
-                <a:solidFill>
-                  <a:srgbClr val="0B5C92"/>
-                </a:solidFill>
-                <a:latin typeface="Menlo Regular"/>
-                <a:ea typeface="Menlo Regular"/>
-                <a:cs typeface="Menlo Regular"/>
-                <a:sym typeface="Courier New"/>
-              </a:rPr>
-              <a:t>puts</a:t>
-            </a:r>
-            <a:r>
-              <a:rPr lang="en" sz="2000" dirty="0">
-                <a:solidFill>
-                  <a:schemeClr val="tx1"/>
-                </a:solidFill>
-                <a:latin typeface="Menlo Regular"/>
-                <a:ea typeface="Menlo Regular"/>
-                <a:cs typeface="Menlo Regular"/>
-                <a:sym typeface="Courier New"/>
-              </a:rPr>
-              <a:t> </a:t>
-            </a:r>
-            <a:r>
-              <a:rPr lang="en" sz="2000" dirty="0">
-                <a:solidFill>
-                  <a:srgbClr val="FF0000"/>
-                </a:solidFill>
-                <a:latin typeface="Menlo Regular"/>
-                <a:ea typeface="Menlo Regular"/>
-                <a:cs typeface="Menlo Regular"/>
-                <a:sym typeface="Courier New"/>
-              </a:rPr>
-              <a:t>"I wish you were from a cooler era."</a:t>
-            </a:r>
-          </a:p>
-          <a:p>
-            <a:pPr lvl="0" rtl="0">
-              <a:spcBef>
-                <a:spcPts val="0"/>
-              </a:spcBef>
-              <a:buNone/>
-            </a:pPr>
-            <a:r>
-              <a:rPr lang="en" sz="2000" dirty="0">
-                <a:solidFill>
-                  <a:schemeClr val="tx1"/>
-                </a:solidFill>
-                <a:latin typeface="Menlo Regular"/>
-                <a:ea typeface="Menlo Regular"/>
-                <a:cs typeface="Menlo Regular"/>
-                <a:sym typeface="Courier New"/>
-              </a:rPr>
-              <a:t>else</a:t>
-            </a:r>
-          </a:p>
-          <a:p>
-            <a:pPr lvl="0" rtl="0">
-              <a:spcBef>
-                <a:spcPts val="0"/>
-              </a:spcBef>
-              <a:buNone/>
-            </a:pPr>
-            <a:r>
-              <a:rPr lang="en" sz="2000" dirty="0">
-                <a:solidFill>
-                  <a:schemeClr val="tx1"/>
-                </a:solidFill>
-                <a:latin typeface="Menlo Regular"/>
-                <a:ea typeface="Menlo Regular"/>
-                <a:cs typeface="Menlo Regular"/>
-                <a:sym typeface="Courier New"/>
-              </a:rPr>
-              <a:t>  </a:t>
-            </a:r>
-            <a:r>
-              <a:rPr lang="en" sz="2000" dirty="0">
-                <a:solidFill>
-                  <a:srgbClr val="0B5C92"/>
-                </a:solidFill>
-                <a:latin typeface="Menlo Regular"/>
-                <a:ea typeface="Menlo Regular"/>
-                <a:cs typeface="Menlo Regular"/>
-                <a:sym typeface="Courier New"/>
-              </a:rPr>
-              <a:t>puts</a:t>
-            </a:r>
-            <a:r>
-              <a:rPr lang="en" sz="2000" dirty="0">
-                <a:solidFill>
-                  <a:schemeClr val="tx1"/>
-                </a:solidFill>
-                <a:latin typeface="Menlo Regular"/>
-                <a:ea typeface="Menlo Regular"/>
-                <a:cs typeface="Menlo Regular"/>
-                <a:sym typeface="Courier New"/>
-              </a:rPr>
-              <a:t> </a:t>
-            </a:r>
-            <a:r>
-              <a:rPr lang="en" sz="2000" dirty="0">
-                <a:solidFill>
-                  <a:srgbClr val="FF0000"/>
-                </a:solidFill>
-                <a:latin typeface="Menlo Regular"/>
-                <a:ea typeface="Menlo Regular"/>
-                <a:cs typeface="Menlo Regular"/>
-                <a:sym typeface="Courier New"/>
-              </a:rPr>
-              <a:t>"Hello, future traveller."</a:t>
-            </a:r>
-          </a:p>
-          <a:p>
-            <a:pPr lvl="0" rtl="0">
-              <a:spcBef>
-                <a:spcPts val="0"/>
-              </a:spcBef>
-              <a:buNone/>
-            </a:pPr>
-            <a:r>
-              <a:rPr lang="en" sz="2000" dirty="0">
-                <a:solidFill>
-                  <a:schemeClr val="tx1"/>
-                </a:solidFill>
-                <a:latin typeface="Menlo Regular"/>
-                <a:ea typeface="Menlo Regular"/>
-                <a:cs typeface="Menlo Regular"/>
-                <a:sym typeface="Courier New"/>
-              </a:rPr>
-              <a:t>end</a:t>
-            </a:r>
+            <a:endParaRPr lang="en" sz="2000" dirty="0">
+              <a:solidFill>
+                <a:schemeClr val="tx1"/>
+              </a:solidFill>
+              <a:latin typeface="Menlo Regular"/>
+              <a:ea typeface="Menlo Regular"/>
+              <a:cs typeface="Menlo Regular"/>
+              <a:sym typeface="Courier New"/>
+            </a:endParaRPr>
           </a:p>
           <a:p>
             <a:pPr lvl="0" rtl="0">
@@ -21968,10 +22170,22 @@
                 <a:cs typeface="Menlo Regular"/>
                 <a:sym typeface="Courier New"/>
               </a:rPr>
-              <a:t>{"Wallace Stevens" </a:t>
-            </a:r>
-            <a:r>
-              <a:rPr lang="en" sz="2000" dirty="0">
+              <a:t>{"Wallace </a:t>
+            </a:r>
+            <a:r>
+              <a:rPr lang="en" sz="2000" dirty="0" smtClean="0">
+                <a:solidFill>
+                  <a:srgbClr val="FF0000"/>
+                </a:solidFill>
+                <a:latin typeface="Menlo Regular"/>
+                <a:ea typeface="Menlo Regular"/>
+                <a:cs typeface="Menlo Regular"/>
+                <a:sym typeface="Courier New"/>
+              </a:rPr>
+              <a:t>Stevens“:</a:t>
+            </a:r>
+            <a:r>
+              <a:rPr lang="en" sz="2000" dirty="0" smtClean="0">
                 <a:solidFill>
                   <a:srgbClr val="000000"/>
                 </a:solidFill>
@@ -21980,7 +22194,7 @@
                 <a:cs typeface="Menlo Regular"/>
                 <a:sym typeface="Courier New"/>
               </a:rPr>
-              <a:t>=&gt; </a:t>
+              <a:t> </a:t>
             </a:r>
             <a:r>
               <a:rPr lang="en" sz="2000" dirty="0">
@@ -22247,11 +22461,47 @@
                 <a:cs typeface="Menlo Regular"/>
                 <a:sym typeface="Courier New"/>
               </a:rPr>
-              <a:t>'Wallace Stevens' </a:t>
+              <a:t>'Wallace </a:t>
+            </a:r>
+            <a:r>
+              <a:rPr lang="en" sz="2100" dirty="0" smtClean="0">
+                <a:solidFill>
+                  <a:srgbClr val="FF0000"/>
+                </a:solidFill>
+                <a:latin typeface="Menlo Regular"/>
+                <a:ea typeface="Menlo Regular"/>
+                <a:cs typeface="Menlo Regular"/>
+                <a:sym typeface="Courier New"/>
+              </a:rPr>
+              <a:t>Stevens‘:</a:t>
+            </a:r>
+            <a:r>
+              <a:rPr lang="en" sz="2100" dirty="0" smtClean="0">
+                <a:solidFill>
+                  <a:schemeClr val="tx1"/>
+                </a:solidFill>
+                <a:latin typeface="Menlo Regular"/>
+                <a:ea typeface="Menlo Regular"/>
+                <a:cs typeface="Menlo Regular"/>
+                <a:sym typeface="Courier New"/>
+              </a:rPr>
+              <a:t> </a:t>
             </a:r>
             <a:r>
               <a:rPr lang="en" sz="2100" dirty="0">
                 <a:solidFill>
+                  <a:srgbClr val="11889C"/>
+                </a:solidFill>
+                <a:latin typeface="Menlo Regular"/>
+                <a:ea typeface="Menlo Regular"/>
+                <a:cs typeface="Menlo Regular"/>
+                <a:sym typeface="Courier New"/>
+              </a:rPr>
+              <a:t>1897</a:t>
+            </a:r>
+            <a:r>
+              <a:rPr lang="en" sz="2100" dirty="0">
+                <a:solidFill>
                   <a:schemeClr val="tx1"/>
                 </a:solidFill>
                 <a:latin typeface="Menlo Regular"/>
@@ -22259,22 +22509,70 @@
                 <a:cs typeface="Menlo Regular"/>
                 <a:sym typeface="Courier New"/>
               </a:rPr>
-              <a:t>=&gt; </a:t>
-            </a:r>
-            <a:r>
-              <a:rPr lang="en" sz="2100" dirty="0">
-                <a:solidFill>
-                  <a:srgbClr val="11889C"/>
-                </a:solidFill>
-                <a:latin typeface="Menlo Regular"/>
-                <a:ea typeface="Menlo Regular"/>
-                <a:cs typeface="Menlo Regular"/>
-                <a:sym typeface="Courier New"/>
-              </a:rPr>
-              <a:t>1897</a:t>
-            </a:r>
-            <a:r>
-              <a:rPr lang="en" sz="2100" dirty="0">
+              <a:t>, </a:t>
+            </a:r>
+            <a:r>
+              <a:rPr lang="en" sz="2100" dirty="0" smtClean="0">
+                <a:solidFill>
+                  <a:srgbClr val="FF0000"/>
+                </a:solidFill>
+                <a:latin typeface="Menlo Regular"/>
+                <a:ea typeface="Menlo Regular"/>
+                <a:cs typeface="Menlo Regular"/>
+                <a:sym typeface="Courier New"/>
+              </a:rPr>
+              <a:t>’</a:t>
+            </a:r>
+            <a:r>
+              <a:rPr lang="en-US" sz="2100" dirty="0" smtClean="0">
+                <a:solidFill>
+                  <a:srgbClr val="FF0000"/>
+                </a:solidFill>
+                <a:latin typeface="Menlo Regular"/>
+                <a:ea typeface="Menlo Regular"/>
+                <a:cs typeface="Menlo Regular"/>
+                <a:sym typeface="Courier New"/>
+              </a:rPr>
+              <a:t>Brandon</a:t>
+            </a:r>
+            <a:r>
+              <a:rPr lang="en" sz="2100" dirty="0" smtClean="0">
+                <a:solidFill>
+                  <a:srgbClr val="FF0000"/>
+                </a:solidFill>
+                <a:latin typeface="Menlo Regular"/>
+                <a:ea typeface="Menlo Regular"/>
+                <a:cs typeface="Menlo Regular"/>
+                <a:sym typeface="Courier New"/>
+              </a:rPr>
+              <a:t> </a:t>
+            </a:r>
+            <a:r>
+              <a:rPr lang="en-US" sz="2100" dirty="0" smtClean="0">
+                <a:solidFill>
+                  <a:srgbClr val="FF0000"/>
+                </a:solidFill>
+                <a:latin typeface="Menlo Regular"/>
+                <a:ea typeface="Menlo Regular"/>
+                <a:cs typeface="Menlo Regular"/>
+                <a:sym typeface="Courier New"/>
+              </a:rPr>
+              <a:t>Walsh</a:t>
+            </a:r>
+            <a:r>
+              <a:rPr lang="en" sz="2200" dirty="0" smtClean="0">
+                <a:solidFill>
+                  <a:srgbClr val="FF0000"/>
+                </a:solidFill>
+                <a:latin typeface="Menlo Regular"/>
+                <a:ea typeface="Menlo Regular"/>
+                <a:cs typeface="Menlo Regular"/>
+                <a:sym typeface="Courier New"/>
+              </a:rPr>
+              <a:t>‘</a:t>
+            </a:r>
+            <a:r>
+              <a:rPr lang="en" sz="2200" dirty="0" smtClean="0">
                 <a:solidFill>
                   <a:schemeClr val="tx1"/>
                 </a:solidFill>
@@ -22283,36 +22581,12 @@
                 <a:cs typeface="Menlo Regular"/>
                 <a:sym typeface="Courier New"/>
               </a:rPr>
-              <a:t>, </a:t>
-            </a:r>
-            <a:r>
-              <a:rPr lang="en" sz="2100" dirty="0" smtClean="0">
-                <a:solidFill>
-                  <a:srgbClr val="FF0000"/>
-                </a:solidFill>
-                <a:latin typeface="Menlo Regular"/>
-                <a:ea typeface="Menlo Regular"/>
-                <a:cs typeface="Menlo Regular"/>
-                <a:sym typeface="Courier New"/>
-              </a:rPr>
-              <a:t>’</a:t>
-            </a:r>
-            <a:r>
-              <a:rPr lang="en-US" sz="2100" dirty="0" smtClean="0">
-                <a:solidFill>
-                  <a:srgbClr val="FF0000"/>
-                </a:solidFill>
-                <a:latin typeface="Menlo Regular"/>
-                <a:ea typeface="Menlo Regular"/>
-                <a:cs typeface="Menlo Regular"/>
-                <a:sym typeface="Courier New"/>
-              </a:rPr>
-              <a:t>Brandon</a:t>
-            </a:r>
-            <a:r>
-              <a:rPr lang="en" sz="2100" dirty="0" smtClean="0">
-                <a:solidFill>
-                  <a:srgbClr val="FF0000"/>
+              <a:t>:</a:t>
+            </a:r>
+            <a:r>
+              <a:rPr lang="en" sz="2200" dirty="0" smtClean="0">
+                <a:solidFill>
+                  <a:schemeClr val="tx1"/>
                 </a:solidFill>
                 <a:latin typeface="Menlo Regular"/>
                 <a:ea typeface="Menlo Regular"/>
@@ -22320,54 +22594,6 @@
                 <a:sym typeface="Courier New"/>
               </a:rPr>
               <a:t> </a:t>
-            </a:r>
-            <a:r>
-              <a:rPr lang="en-US" sz="2100" dirty="0" smtClean="0">
-                <a:solidFill>
-                  <a:srgbClr val="FF0000"/>
-                </a:solidFill>
-                <a:latin typeface="Menlo Regular"/>
-                <a:ea typeface="Menlo Regular"/>
-                <a:cs typeface="Menlo Regular"/>
-                <a:sym typeface="Courier New"/>
-              </a:rPr>
-              <a:t>Walsh</a:t>
-            </a:r>
-            <a:r>
-              <a:rPr lang="en" sz="2200" dirty="0" smtClean="0">
-                <a:solidFill>
-                  <a:srgbClr val="FF0000"/>
-                </a:solidFill>
-                <a:latin typeface="Menlo Regular"/>
-                <a:ea typeface="Menlo Regular"/>
-                <a:cs typeface="Menlo Regular"/>
-                <a:sym typeface="Courier New"/>
-              </a:rPr>
-              <a:t>'</a:t>
-            </a:r>
-            <a:r>
-              <a:rPr lang="en" sz="2200" dirty="0" smtClean="0">
-                <a:solidFill>
-                  <a:schemeClr val="tx1"/>
-                </a:solidFill>
-                <a:latin typeface="Menlo Regular"/>
-                <a:ea typeface="Menlo Regular"/>
-                <a:cs typeface="Menlo Regular"/>
-                <a:sym typeface="Courier New"/>
-              </a:rPr>
-              <a:t> </a:t>
-            </a:r>
-            <a:r>
-              <a:rPr lang="en" sz="2200" dirty="0">
-                <a:solidFill>
-                  <a:schemeClr val="tx1"/>
-                </a:solidFill>
-                <a:latin typeface="Menlo Regular"/>
-                <a:ea typeface="Menlo Regular"/>
-                <a:cs typeface="Menlo Regular"/>
-                <a:sym typeface="Courier New"/>
-              </a:rPr>
-              <a:t>=&gt; </a:t>
             </a:r>
             <a:r>
               <a:rPr lang="en" sz="2200" dirty="0">
@@ -22495,18 +22721,7 @@
               </a:rPr>
               <a:t> </a:t>
             </a:r>
-          </a:p>
-          <a:p>
-            <a:pPr lvl="0" rtl="0">
-              <a:lnSpc>
-                <a:spcPct val="115000"/>
-              </a:lnSpc>
-              <a:spcBef>
-                <a:spcPts val="0"/>
-              </a:spcBef>
-              <a:buNone/>
-            </a:pPr>
-            <a:endParaRPr sz="1000" dirty="0">
+            <a:endParaRPr lang="en" sz="2200" dirty="0" smtClean="0">
               <a:solidFill>
                 <a:schemeClr val="tx1"/>
               </a:solidFill>
@@ -22526,18 +22741,15 @@
               </a:spcBef>
               <a:buNone/>
             </a:pPr>
-            <a:r>
-              <a:rPr lang="en" sz="2200" dirty="0">
-                <a:solidFill>
-                  <a:schemeClr val="tx1"/>
-                </a:solidFill>
-                <a:latin typeface="Menlo Regular"/>
-                <a:ea typeface="Menlo Regular"/>
-                <a:cs typeface="Menlo Regular"/>
-                <a:sym typeface="Courier New"/>
-              </a:rPr>
-              <a:t>birth_dates.each do |person, b_date|</a:t>
-            </a:r>
+            <a:endParaRPr lang="en" sz="2200" dirty="0">
+              <a:solidFill>
+                <a:schemeClr val="tx1"/>
+              </a:solidFill>
+              <a:latin typeface="Menlo Regular"/>
+              <a:ea typeface="Menlo Regular"/>
+              <a:cs typeface="Menlo Regular"/>
+              <a:sym typeface="Courier New"/>
+            </a:endParaRPr>
           </a:p>
           <a:p>
             <a:pPr lvl="0" rtl="0">
@@ -22550,7 +22762,7 @@
               <a:buNone/>
             </a:pPr>
             <a:r>
-              <a:rPr lang="en" sz="2200" dirty="0">
+              <a:rPr lang="en-US" sz="2200" dirty="0" smtClean="0">
                 <a:solidFill>
                   <a:schemeClr val="tx1"/>
                 </a:solidFill>
@@ -22559,20 +22771,65 @@
                 <a:cs typeface="Menlo Regular"/>
                 <a:sym typeface="Courier New"/>
               </a:rPr>
-              <a:t>  if b_date &lt; </a:t>
-            </a:r>
-            <a:r>
-              <a:rPr lang="en" sz="2200" dirty="0">
-                <a:solidFill>
-                  <a:srgbClr val="11889C"/>
-                </a:solidFill>
-                <a:latin typeface="Menlo Regular"/>
-                <a:ea typeface="Menlo Regular"/>
-                <a:cs typeface="Menlo Regular"/>
-                <a:sym typeface="Courier New"/>
-              </a:rPr>
-              <a:t>1900</a:t>
-            </a:r>
+              <a:t>for person, </a:t>
+            </a:r>
+            <a:r>
+              <a:rPr lang="en-US" sz="2200" dirty="0" err="1" smtClean="0">
+                <a:solidFill>
+                  <a:schemeClr val="tx1"/>
+                </a:solidFill>
+                <a:latin typeface="Menlo Regular"/>
+                <a:ea typeface="Menlo Regular"/>
+                <a:cs typeface="Menlo Regular"/>
+                <a:sym typeface="Courier New"/>
+              </a:rPr>
+              <a:t>b_date</a:t>
+            </a:r>
+            <a:r>
+              <a:rPr lang="en-US" sz="2200" dirty="0" smtClean="0">
+                <a:solidFill>
+                  <a:schemeClr val="tx1"/>
+                </a:solidFill>
+                <a:latin typeface="Menlo Regular"/>
+                <a:ea typeface="Menlo Regular"/>
+                <a:cs typeface="Menlo Regular"/>
+                <a:sym typeface="Courier New"/>
+              </a:rPr>
+              <a:t> in </a:t>
+            </a:r>
+            <a:r>
+              <a:rPr lang="en-US" sz="2200" dirty="0" err="1" smtClean="0">
+                <a:solidFill>
+                  <a:schemeClr val="tx1"/>
+                </a:solidFill>
+                <a:latin typeface="Menlo Regular"/>
+                <a:ea typeface="Menlo Regular"/>
+                <a:cs typeface="Menlo Regular"/>
+                <a:sym typeface="Courier New"/>
+              </a:rPr>
+              <a:t>birth_dates.items</a:t>
+            </a:r>
+            <a:r>
+              <a:rPr lang="en-US" sz="2200" dirty="0" smtClean="0">
+                <a:solidFill>
+                  <a:schemeClr val="tx1"/>
+                </a:solidFill>
+                <a:latin typeface="Menlo Regular"/>
+                <a:ea typeface="Menlo Regular"/>
+                <a:cs typeface="Menlo Regular"/>
+                <a:sym typeface="Courier New"/>
+              </a:rPr>
+              <a:t>():</a:t>
+            </a:r>
+            <a:endParaRPr lang="en" sz="2200" dirty="0">
+              <a:solidFill>
+                <a:schemeClr val="tx1"/>
+              </a:solidFill>
+              <a:latin typeface="Menlo Regular"/>
+              <a:ea typeface="Menlo Regular"/>
+              <a:cs typeface="Menlo Regular"/>
+              <a:sym typeface="Courier New"/>
+            </a:endParaRPr>
           </a:p>
           <a:p>
             <a:pPr lvl="0" rtl="0">
@@ -22594,10 +22851,10 @@
                 <a:cs typeface="Menlo Regular"/>
                 <a:sym typeface="Courier New"/>
               </a:rPr>
-              <a:t>    nineteenth_count += </a:t>
-            </a:r>
-            <a:r>
-              <a:rPr lang="en" sz="2200" dirty="0">
+              <a:t>  if b_date &lt; </a:t>
+            </a:r>
+            <a:r>
+              <a:rPr lang="en" sz="2200" dirty="0" smtClean="0">
                 <a:solidFill>
                   <a:srgbClr val="11889C"/>
                 </a:solidFill>
@@ -22606,8 +22863,17 @@
                 <a:cs typeface="Menlo Regular"/>
                 <a:sym typeface="Courier New"/>
               </a:rPr>
-              <a:t>1</a:t>
-            </a:r>
+              <a:t>1900:</a:t>
+            </a:r>
+            <a:endParaRPr lang="en" sz="2200" dirty="0">
+              <a:solidFill>
+                <a:srgbClr val="11889C"/>
+              </a:solidFill>
+              <a:latin typeface="Menlo Regular"/>
+              <a:ea typeface="Menlo Regular"/>
+              <a:cs typeface="Menlo Regular"/>
+              <a:sym typeface="Courier New"/>
+            </a:endParaRPr>
           </a:p>
           <a:p>
             <a:pPr lvl="0" rtl="0">
@@ -22629,7 +22895,19 @@
                 <a:cs typeface="Menlo Regular"/>
                 <a:sym typeface="Courier New"/>
               </a:rPr>
-              <a:t>  else</a:t>
+              <a:t>    nineteenth_count += </a:t>
+            </a:r>
+            <a:r>
+              <a:rPr lang="en" sz="2200" dirty="0">
+                <a:solidFill>
+                  <a:srgbClr val="11889C"/>
+                </a:solidFill>
+                <a:latin typeface="Menlo Regular"/>
+                <a:ea typeface="Menlo Regular"/>
+                <a:cs typeface="Menlo Regular"/>
+                <a:sym typeface="Courier New"/>
+              </a:rPr>
+              <a:t>1</a:t>
             </a:r>
           </a:p>
           <a:p>
@@ -22652,20 +22930,29 @@
                 <a:cs typeface="Menlo Regular"/>
                 <a:sym typeface="Courier New"/>
               </a:rPr>
-              <a:t>    twentieth_count += </a:t>
-            </a:r>
-            <a:r>
-              <a:rPr lang="en" sz="2200" dirty="0">
-                <a:solidFill>
-                  <a:srgbClr val="11889C"/>
-                </a:solidFill>
-                <a:latin typeface="Menlo Regular"/>
-                <a:ea typeface="Menlo Regular"/>
-                <a:cs typeface="Menlo Regular"/>
-                <a:sym typeface="Courier New"/>
-              </a:rPr>
-              <a:t>1</a:t>
-            </a:r>
+              <a:t>  </a:t>
+            </a:r>
+            <a:r>
+              <a:rPr lang="en" sz="2200" dirty="0" smtClean="0">
+                <a:solidFill>
+                  <a:schemeClr val="tx1"/>
+                </a:solidFill>
+                <a:latin typeface="Menlo Regular"/>
+                <a:ea typeface="Menlo Regular"/>
+                <a:cs typeface="Menlo Regular"/>
+                <a:sym typeface="Courier New"/>
+              </a:rPr>
+              <a:t>else:</a:t>
+            </a:r>
+            <a:endParaRPr lang="en" sz="2200" dirty="0">
+              <a:solidFill>
+                <a:schemeClr val="tx1"/>
+              </a:solidFill>
+              <a:latin typeface="Menlo Regular"/>
+              <a:ea typeface="Menlo Regular"/>
+              <a:cs typeface="Menlo Regular"/>
+              <a:sym typeface="Courier New"/>
+            </a:endParaRPr>
           </a:p>
           <a:p>
             <a:pPr lvl="0" rtl="0">
@@ -22687,31 +22974,29 @@
                 <a:cs typeface="Menlo Regular"/>
                 <a:sym typeface="Courier New"/>
               </a:rPr>
-              <a:t>  end</a:t>
-            </a:r>
-          </a:p>
-          <a:p>
-            <a:pPr lvl="0" rtl="0">
-              <a:lnSpc>
-                <a:spcPct val="115000"/>
-              </a:lnSpc>
-              <a:spcBef>
-                <a:spcPts val="0"/>
-              </a:spcBef>
-              <a:buNone/>
-            </a:pPr>
-            <a:r>
-              <a:rPr lang="en" sz="2200" dirty="0">
-                <a:solidFill>
-                  <a:schemeClr val="tx1"/>
-                </a:solidFill>
-                <a:latin typeface="Menlo Regular"/>
-                <a:ea typeface="Menlo Regular"/>
-                <a:cs typeface="Menlo Regular"/>
-                <a:sym typeface="Courier New"/>
-              </a:rPr>
-              <a:t>end</a:t>
-            </a:r>
+              <a:t>    twentieth_count += </a:t>
+            </a:r>
+            <a:r>
+              <a:rPr lang="en" sz="2200" dirty="0" smtClean="0">
+                <a:solidFill>
+                  <a:srgbClr val="11889C"/>
+                </a:solidFill>
+                <a:latin typeface="Menlo Regular"/>
+                <a:ea typeface="Menlo Regular"/>
+                <a:cs typeface="Menlo Regular"/>
+                <a:sym typeface="Courier New"/>
+              </a:rPr>
+              <a:t>1</a:t>
+            </a:r>
+            <a:endParaRPr lang="en" sz="2200" dirty="0">
+              <a:solidFill>
+                <a:schemeClr val="tx1"/>
+              </a:solidFill>
+              <a:latin typeface="Menlo Regular"/>
+              <a:ea typeface="Menlo Regular"/>
+              <a:cs typeface="Menlo Regular"/>
+              <a:sym typeface="Courier New"/>
+            </a:endParaRPr>
           </a:p>
           <a:p>
             <a:pPr lvl="0" rtl="0">
@@ -22890,16 +23175,40 @@
               <a:buNone/>
             </a:pPr>
             <a:r>
+              <a:rPr lang="en" sz="2400" dirty="0" smtClean="0">
+                <a:solidFill>
+                  <a:srgbClr val="0B5C92"/>
+                </a:solidFill>
+                <a:latin typeface="Menlo Regular"/>
+                <a:ea typeface="Menlo Regular"/>
+                <a:cs typeface="Menlo Regular"/>
+                <a:sym typeface="Courier New"/>
+              </a:rPr>
+              <a:t>print(</a:t>
+            </a:r>
+            <a:r>
+              <a:rPr lang="en" sz="2400" dirty="0" smtClean="0">
+                <a:solidFill>
+                  <a:srgbClr val="FF0000"/>
+                </a:solidFill>
+                <a:latin typeface="Menlo Regular"/>
+                <a:ea typeface="Menlo Regular"/>
+                <a:cs typeface="Menlo Regular"/>
+                <a:sym typeface="Courier New"/>
+              </a:rPr>
+              <a:t>"There </a:t>
+            </a:r>
+            <a:r>
               <a:rPr lang="en" sz="2400" dirty="0">
                 <a:solidFill>
-                  <a:srgbClr val="0B5C92"/>
-                </a:solidFill>
-                <a:latin typeface="Menlo Regular"/>
-                <a:ea typeface="Menlo Regular"/>
-                <a:cs typeface="Menlo Regular"/>
-                <a:sym typeface="Courier New"/>
-              </a:rPr>
-              <a:t>puts</a:t>
+                  <a:srgbClr val="FF0000"/>
+                </a:solidFill>
+                <a:latin typeface="Menlo Regular"/>
+                <a:ea typeface="Menlo Regular"/>
+                <a:cs typeface="Menlo Regular"/>
+                <a:sym typeface="Courier New"/>
+              </a:rPr>
+              <a:t>are " </a:t>
             </a:r>
             <a:r>
               <a:rPr lang="en" sz="2400" dirty="0">
@@ -22911,11 +23220,35 @@
                 <a:cs typeface="Menlo Regular"/>
                 <a:sym typeface="Courier New"/>
               </a:rPr>
-              <a:t> </a:t>
+              <a:t>+ </a:t>
+            </a:r>
+            <a:r>
+              <a:rPr lang="en" sz="2400" dirty="0" smtClean="0">
+                <a:solidFill>
+                  <a:schemeClr val="tx1"/>
+                </a:solidFill>
+                <a:latin typeface="Menlo Regular"/>
+                <a:ea typeface="Menlo Regular"/>
+                <a:cs typeface="Menlo Regular"/>
+                <a:sym typeface="Courier New"/>
+              </a:rPr>
+              <a:t>str(nineteenth_count) </a:t>
             </a:r>
             <a:r>
               <a:rPr lang="en" sz="2400" dirty="0">
                 <a:solidFill>
+                  <a:schemeClr val="tx1"/>
+                </a:solidFill>
+                <a:latin typeface="Menlo Regular"/>
+                <a:ea typeface="Menlo Regular"/>
+                <a:cs typeface="Menlo Regular"/>
+                <a:sym typeface="Courier New"/>
+              </a:rPr>
+              <a:t>+ </a:t>
+            </a:r>
+            <a:r>
+              <a:rPr lang="en" sz="2400" dirty="0">
+                <a:solidFill>
                   <a:srgbClr val="FF0000"/>
                 </a:solidFill>
                 <a:latin typeface="Menlo Regular"/>
@@ -22923,7 +23256,7 @@
                 <a:cs typeface="Menlo Regular"/>
                 <a:sym typeface="Courier New"/>
               </a:rPr>
-              <a:t>"There are " </a:t>
+              <a:t>" 19th-c. births and " </a:t>
             </a:r>
             <a:r>
               <a:rPr lang="en" sz="2400" dirty="0">
@@ -22935,11 +23268,35 @@
                 <a:cs typeface="Menlo Regular"/>
                 <a:sym typeface="Courier New"/>
               </a:rPr>
-              <a:t>+ nineteenth_count.to_s + </a:t>
+              <a:t>+ </a:t>
+            </a:r>
+            <a:r>
+              <a:rPr lang="en" sz="2400" dirty="0" smtClean="0">
+                <a:solidFill>
+                  <a:schemeClr val="tx1"/>
+                </a:solidFill>
+                <a:latin typeface="Menlo Regular"/>
+                <a:ea typeface="Menlo Regular"/>
+                <a:cs typeface="Menlo Regular"/>
+                <a:sym typeface="Courier New"/>
+              </a:rPr>
+              <a:t>str(twentieth_count) </a:t>
             </a:r>
             <a:r>
               <a:rPr lang="en" sz="2400" dirty="0">
                 <a:solidFill>
+                  <a:schemeClr val="tx1"/>
+                </a:solidFill>
+                <a:latin typeface="Menlo Regular"/>
+                <a:ea typeface="Menlo Regular"/>
+                <a:cs typeface="Menlo Regular"/>
+                <a:sym typeface="Courier New"/>
+              </a:rPr>
+              <a:t>+ </a:t>
+            </a:r>
+            <a:r>
+              <a:rPr lang="en" sz="2400" dirty="0">
+                <a:solidFill>
                   <a:srgbClr val="FF0000"/>
                 </a:solidFill>
                 <a:latin typeface="Menlo Regular"/>
@@ -22947,22 +23304,10 @@
                 <a:cs typeface="Menlo Regular"/>
                 <a:sym typeface="Courier New"/>
               </a:rPr>
-              <a:t>" 19th-c. births and " </a:t>
-            </a:r>
-            <a:r>
-              <a:rPr lang="en" sz="2400" dirty="0">
-                <a:solidFill>
-                  <a:schemeClr val="tx1"/>
-                </a:solidFill>
-                <a:latin typeface="Menlo Regular"/>
-                <a:ea typeface="Menlo Regular"/>
-                <a:cs typeface="Menlo Regular"/>
-                <a:sym typeface="Courier New"/>
-              </a:rPr>
-              <a:t>+ twentieth_count.to_s + </a:t>
-            </a:r>
-            <a:r>
-              <a:rPr lang="en" sz="2400" dirty="0">
+              <a:t>" 20th-c. births in my collection</a:t>
+            </a:r>
+            <a:r>
+              <a:rPr lang="en" sz="2400" dirty="0" smtClean="0">
                 <a:solidFill>
                   <a:srgbClr val="FF0000"/>
                 </a:solidFill>
@@ -22971,8 +23316,17 @@
                 <a:cs typeface="Menlo Regular"/>
                 <a:sym typeface="Courier New"/>
               </a:rPr>
-              <a:t>" 20th-c. births in my collection."</a:t>
-            </a:r>
+              <a:t>.“)</a:t>
+            </a:r>
+            <a:endParaRPr lang="en" sz="2400" dirty="0">
+              <a:solidFill>
+                <a:srgbClr val="FF0000"/>
+              </a:solidFill>
+              <a:latin typeface="Menlo Regular"/>
+              <a:ea typeface="Menlo Regular"/>
+              <a:cs typeface="Menlo Regular"/>
+              <a:sym typeface="Courier New"/>
+            </a:endParaRPr>
           </a:p>
           <a:p>
             <a:pPr lvl="0" rtl="0">

</xml_diff>

<commit_message>
updated the powerpoint concepts ii and review 2
</commit_message>
<xml_diff>
--- a/2017/python/B Done - ish/Python - Programming Concepts II.pptx
+++ b/2017/python/B Done - ish/Python - Programming Concepts II.pptx
@@ -15356,7 +15356,31 @@
                 <a:cs typeface="Menlo Regular"/>
                 <a:sym typeface="Courier New"/>
               </a:rPr>
-              <a:t>if counter &gt;5:</a:t>
+              <a:t>if </a:t>
+            </a:r>
+            <a:r>
+              <a:rPr lang="en-US" sz="2400" smtClean="0">
+                <a:solidFill>
+                  <a:schemeClr val="tx1"/>
+                </a:solidFill>
+                <a:latin typeface="Menlo Regular"/>
+                <a:ea typeface="Menlo Regular"/>
+                <a:cs typeface="Menlo Regular"/>
+                <a:sym typeface="Courier New"/>
+              </a:rPr>
+              <a:t>counter &gt; 5</a:t>
+            </a:r>
+            <a:r>
+              <a:rPr lang="en-US" sz="2400" dirty="0" smtClean="0">
+                <a:solidFill>
+                  <a:schemeClr val="tx1"/>
+                </a:solidFill>
+                <a:latin typeface="Menlo Regular"/>
+                <a:ea typeface="Menlo Regular"/>
+                <a:cs typeface="Menlo Regular"/>
+                <a:sym typeface="Courier New"/>
+              </a:rPr>
+              <a:t>:</a:t>
             </a:r>
           </a:p>
           <a:p>
@@ -17072,11 +17096,7 @@
             </a:r>
             <a:r>
               <a:rPr lang="en-US" sz="2400" dirty="0" err="1" smtClean="0"/>
-              <a:t>u</a:t>
-            </a:r>
-            <a:r>
-              <a:rPr lang="en-US" sz="2400" dirty="0" err="1" smtClean="0"/>
-              <a:t>ser_name</a:t>
+              <a:t>user_name</a:t>
             </a:r>
             <a:r>
               <a:rPr lang="en-US" sz="2400" dirty="0" smtClean="0"/>
@@ -18803,8 +18823,29 @@
                 <a:cs typeface="Menlo Regular"/>
                 <a:sym typeface="Courier New"/>
               </a:rPr>
-              <a:t>(x, y)</a:t>
-            </a:r>
+              <a:t>(x, y</a:t>
+            </a:r>
+            <a:r>
+              <a:rPr lang="en" sz="2400" dirty="0" smtClean="0">
+                <a:solidFill>
+                  <a:srgbClr val="000000"/>
+                </a:solidFill>
+                <a:latin typeface="Menlo Regular"/>
+                <a:ea typeface="Menlo Regular"/>
+                <a:cs typeface="Menlo Regular"/>
+                <a:sym typeface="Courier New"/>
+              </a:rPr>
+              <a:t>):</a:t>
+            </a:r>
+            <a:endParaRPr lang="en" sz="2400" dirty="0">
+              <a:solidFill>
+                <a:srgbClr val="000000"/>
+              </a:solidFill>
+              <a:latin typeface="Menlo Regular"/>
+              <a:ea typeface="Menlo Regular"/>
+              <a:cs typeface="Menlo Regular"/>
+              <a:sym typeface="Courier New"/>
+            </a:endParaRPr>
           </a:p>
           <a:p>
             <a:pPr lvl="0" rtl="0">
@@ -18823,23 +18864,35 @@
                 <a:cs typeface="Menlo Regular"/>
                 <a:sym typeface="Courier New"/>
               </a:rPr>
-              <a:t>    </a:t>
+              <a:t> </a:t>
+            </a:r>
+            <a:r>
+              <a:rPr lang="en" sz="2400" dirty="0" smtClean="0">
+                <a:solidFill>
+                  <a:srgbClr val="000000"/>
+                </a:solidFill>
+                <a:latin typeface="Menlo Regular"/>
+                <a:ea typeface="Menlo Regular"/>
+                <a:cs typeface="Menlo Regular"/>
+                <a:sym typeface="Courier New"/>
+              </a:rPr>
+              <a:t>    print(</a:t>
+            </a:r>
+            <a:r>
+              <a:rPr lang="en" sz="2400" dirty="0" smtClean="0">
+                <a:solidFill>
+                  <a:srgbClr val="000000"/>
+                </a:solidFill>
+                <a:latin typeface="Menlo Regular"/>
+                <a:ea typeface="Menlo Regular"/>
+                <a:cs typeface="Menlo Regular"/>
+                <a:sym typeface="Courier New"/>
+              </a:rPr>
+              <a:t>x </a:t>
             </a:r>
             <a:r>
               <a:rPr lang="en" sz="2400" dirty="0">
                 <a:solidFill>
-                  <a:srgbClr val="0B5C92"/>
-                </a:solidFill>
-                <a:latin typeface="Menlo Regular"/>
-                <a:ea typeface="Menlo Regular"/>
-                <a:cs typeface="Menlo Regular"/>
-                <a:sym typeface="Courier New"/>
-              </a:rPr>
-              <a:t>puts</a:t>
-            </a:r>
-            <a:r>
-              <a:rPr lang="en" sz="2400" dirty="0">
-                <a:solidFill>
                   <a:srgbClr val="000000"/>
                 </a:solidFill>
                 <a:latin typeface="Menlo Regular"/>
@@ -18847,18 +18900,10 @@
                 <a:cs typeface="Menlo Regular"/>
                 <a:sym typeface="Courier New"/>
               </a:rPr>
-              <a:t> x + y</a:t>
-            </a:r>
-          </a:p>
-          <a:p>
-            <a:pPr lvl="0" rtl="0">
-              <a:spcBef>
-                <a:spcPts val="0"/>
-              </a:spcBef>
-              <a:buNone/>
-            </a:pPr>
-            <a:r>
-              <a:rPr lang="en" sz="2400" dirty="0">
+              <a:t>+ </a:t>
+            </a:r>
+            <a:r>
+              <a:rPr lang="en" sz="2400" dirty="0" smtClean="0">
                 <a:solidFill>
                   <a:srgbClr val="000000"/>
                 </a:solidFill>
@@ -18867,8 +18912,17 @@
                 <a:cs typeface="Menlo Regular"/>
                 <a:sym typeface="Courier New"/>
               </a:rPr>
-              <a:t>end</a:t>
-            </a:r>
+              <a:t>y)</a:t>
+            </a:r>
+            <a:endParaRPr lang="en" sz="2400" dirty="0">
+              <a:solidFill>
+                <a:srgbClr val="000000"/>
+              </a:solidFill>
+              <a:latin typeface="Menlo Regular"/>
+              <a:ea typeface="Menlo Regular"/>
+              <a:cs typeface="Menlo Regular"/>
+              <a:sym typeface="Courier New"/>
+            </a:endParaRPr>
           </a:p>
         </p:txBody>
       </p:sp>
@@ -21234,19 +21288,7 @@
                 <a:cs typeface="Menlo Regular"/>
                 <a:sym typeface="Courier New"/>
               </a:rPr>
-              <a:t>and </a:t>
-            </a:r>
-            <a:r>
-              <a:rPr lang="en" sz="2000" dirty="0" smtClean="0">
-                <a:solidFill>
-                  <a:schemeClr val="tx1"/>
-                </a:solidFill>
-                <a:latin typeface="Menlo Regular"/>
-                <a:ea typeface="Menlo Regular"/>
-                <a:cs typeface="Menlo Regular"/>
-                <a:sym typeface="Courier New"/>
-              </a:rPr>
-              <a:t>year </a:t>
+              <a:t>and year </a:t>
             </a:r>
             <a:r>
               <a:rPr lang="en" sz="2000" dirty="0">
@@ -21712,8 +21754,29 @@
                 <a:cs typeface="Menlo Regular"/>
                 <a:sym typeface="Courier New"/>
               </a:rPr>
-              <a:t>(year)</a:t>
-            </a:r>
+              <a:t>(year</a:t>
+            </a:r>
+            <a:r>
+              <a:rPr lang="en" sz="2100" dirty="0" smtClean="0">
+                <a:solidFill>
+                  <a:schemeClr val="tx1"/>
+                </a:solidFill>
+                <a:latin typeface="Menlo Regular"/>
+                <a:ea typeface="Menlo Regular"/>
+                <a:cs typeface="Menlo Regular"/>
+                <a:sym typeface="Courier New"/>
+              </a:rPr>
+              <a:t>):</a:t>
+            </a:r>
+            <a:endParaRPr lang="en" sz="2100" dirty="0">
+              <a:solidFill>
+                <a:schemeClr val="tx1"/>
+              </a:solidFill>
+              <a:latin typeface="Menlo Regular"/>
+              <a:ea typeface="Menlo Regular"/>
+              <a:cs typeface="Menlo Regular"/>
+              <a:sym typeface="Courier New"/>
+            </a:endParaRPr>
           </a:p>
           <a:p>
             <a:pPr lvl="0" rtl="0">
@@ -21735,8 +21798,150 @@
               <a:t>  if year &lt; </a:t>
             </a:r>
             <a:r>
+              <a:rPr lang="en" sz="2100" dirty="0" smtClean="0">
+                <a:solidFill>
+                  <a:srgbClr val="11889C"/>
+                </a:solidFill>
+                <a:latin typeface="Menlo Regular"/>
+                <a:ea typeface="Menlo Regular"/>
+                <a:cs typeface="Menlo Regular"/>
+                <a:sym typeface="Courier New"/>
+              </a:rPr>
+              <a:t>1900:</a:t>
+            </a:r>
+            <a:endParaRPr lang="en" sz="2100" dirty="0">
+              <a:solidFill>
+                <a:srgbClr val="11889C"/>
+              </a:solidFill>
+              <a:latin typeface="Menlo Regular"/>
+              <a:ea typeface="Menlo Regular"/>
+              <a:cs typeface="Menlo Regular"/>
+              <a:sym typeface="Courier New"/>
+            </a:endParaRPr>
+          </a:p>
+          <a:p>
+            <a:pPr lvl="0" rtl="0">
+              <a:spcBef>
+                <a:spcPts val="0"/>
+              </a:spcBef>
+              <a:buNone/>
+            </a:pPr>
+            <a:r>
+              <a:rPr lang="en" sz="2100" dirty="0" smtClean="0">
+                <a:solidFill>
+                  <a:srgbClr val="FF0000"/>
+                </a:solidFill>
+                <a:latin typeface="Menlo Regular"/>
+                <a:ea typeface="Menlo Regular"/>
+                <a:cs typeface="Menlo Regular"/>
+                <a:sym typeface="Courier New"/>
+              </a:rPr>
+              <a:t>    </a:t>
+            </a:r>
+            <a:r>
+              <a:rPr lang="en" sz="2100" dirty="0" smtClean="0">
+                <a:solidFill>
+                  <a:schemeClr val="tx1"/>
+                </a:solidFill>
+                <a:latin typeface="Menlo Regular"/>
+                <a:ea typeface="Menlo Regular"/>
+                <a:cs typeface="Menlo Regular"/>
+                <a:sym typeface="Courier New"/>
+              </a:rPr>
+              <a:t>print(</a:t>
+            </a:r>
+            <a:r>
+              <a:rPr lang="en" sz="2100" dirty="0" smtClean="0">
+                <a:solidFill>
+                  <a:srgbClr val="FF0000"/>
+                </a:solidFill>
+                <a:latin typeface="Menlo Regular"/>
+                <a:ea typeface="Menlo Regular"/>
+                <a:cs typeface="Menlo Regular"/>
+                <a:sym typeface="Courier New"/>
+              </a:rPr>
+              <a:t>"Tell </a:t>
+            </a:r>
+            <a:r>
               <a:rPr lang="en" sz="2100" dirty="0">
                 <a:solidFill>
+                  <a:srgbClr val="FF0000"/>
+                </a:solidFill>
+                <a:latin typeface="Menlo Regular"/>
+                <a:ea typeface="Menlo Regular"/>
+                <a:cs typeface="Menlo Regular"/>
+                <a:sym typeface="Courier New"/>
+              </a:rPr>
+              <a:t>me of the past</a:t>
+            </a:r>
+            <a:r>
+              <a:rPr lang="en" sz="2100" dirty="0" smtClean="0">
+                <a:solidFill>
+                  <a:srgbClr val="FF0000"/>
+                </a:solidFill>
+                <a:latin typeface="Menlo Regular"/>
+                <a:ea typeface="Menlo Regular"/>
+                <a:cs typeface="Menlo Regular"/>
+                <a:sym typeface="Courier New"/>
+              </a:rPr>
+              <a:t>!“)</a:t>
+            </a:r>
+            <a:endParaRPr lang="en" sz="2100" dirty="0">
+              <a:solidFill>
+                <a:srgbClr val="FF0000"/>
+              </a:solidFill>
+              <a:latin typeface="Menlo Regular"/>
+              <a:ea typeface="Menlo Regular"/>
+              <a:cs typeface="Menlo Regular"/>
+              <a:sym typeface="Courier New"/>
+            </a:endParaRPr>
+          </a:p>
+          <a:p>
+            <a:pPr lvl="0" rtl="0">
+              <a:spcBef>
+                <a:spcPts val="0"/>
+              </a:spcBef>
+              <a:buNone/>
+            </a:pPr>
+            <a:r>
+              <a:rPr lang="en" sz="2100" dirty="0">
+                <a:solidFill>
+                  <a:schemeClr val="tx1"/>
+                </a:solidFill>
+                <a:latin typeface="Menlo Regular"/>
+                <a:ea typeface="Menlo Regular"/>
+                <a:cs typeface="Menlo Regular"/>
+                <a:sym typeface="Courier New"/>
+              </a:rPr>
+              <a:t>  </a:t>
+            </a:r>
+            <a:r>
+              <a:rPr lang="en" sz="2100" dirty="0" smtClean="0">
+                <a:solidFill>
+                  <a:schemeClr val="tx1"/>
+                </a:solidFill>
+                <a:latin typeface="Menlo Regular"/>
+                <a:ea typeface="Menlo Regular"/>
+                <a:cs typeface="Menlo Regular"/>
+                <a:sym typeface="Courier New"/>
+              </a:rPr>
+              <a:t>elif </a:t>
+            </a:r>
+            <a:r>
+              <a:rPr lang="en" sz="2100" dirty="0">
+                <a:solidFill>
+                  <a:schemeClr val="tx1"/>
+                </a:solidFill>
+                <a:latin typeface="Menlo Regular"/>
+                <a:ea typeface="Menlo Regular"/>
+                <a:cs typeface="Menlo Regular"/>
+                <a:sym typeface="Courier New"/>
+              </a:rPr>
+              <a:t>year &gt;= </a:t>
+            </a:r>
+            <a:r>
+              <a:rPr lang="en" sz="2100" dirty="0">
+                <a:solidFill>
                   <a:srgbClr val="11889C"/>
                 </a:solidFill>
                 <a:latin typeface="Menlo Regular"/>
@@ -21746,6 +21951,75 @@
               </a:rPr>
               <a:t>1900</a:t>
             </a:r>
+            <a:r>
+              <a:rPr lang="en" sz="2100" dirty="0">
+                <a:solidFill>
+                  <a:schemeClr val="tx1"/>
+                </a:solidFill>
+                <a:latin typeface="Menlo Regular"/>
+                <a:ea typeface="Menlo Regular"/>
+                <a:cs typeface="Menlo Regular"/>
+                <a:sym typeface="Courier New"/>
+              </a:rPr>
+              <a:t> </a:t>
+            </a:r>
+            <a:r>
+              <a:rPr lang="en" sz="2100" dirty="0" smtClean="0">
+                <a:solidFill>
+                  <a:schemeClr val="tx1"/>
+                </a:solidFill>
+                <a:latin typeface="Menlo Regular"/>
+                <a:ea typeface="Menlo Regular"/>
+                <a:cs typeface="Menlo Regular"/>
+                <a:sym typeface="Courier New"/>
+              </a:rPr>
+              <a:t>and</a:t>
+            </a:r>
+            <a:r>
+              <a:rPr lang="en" sz="2100" dirty="0" smtClean="0">
+                <a:solidFill>
+                  <a:schemeClr val="tx1"/>
+                </a:solidFill>
+                <a:latin typeface="Menlo Regular"/>
+                <a:ea typeface="Menlo Regular"/>
+                <a:cs typeface="Menlo Regular"/>
+                <a:sym typeface="Courier New"/>
+              </a:rPr>
+              <a:t> </a:t>
+            </a:r>
+            <a:r>
+              <a:rPr lang="en" sz="2100" dirty="0">
+                <a:solidFill>
+                  <a:schemeClr val="tx1"/>
+                </a:solidFill>
+                <a:latin typeface="Menlo Regular"/>
+                <a:ea typeface="Menlo Regular"/>
+                <a:cs typeface="Menlo Regular"/>
+                <a:sym typeface="Courier New"/>
+              </a:rPr>
+              <a:t>year &lt;= </a:t>
+            </a:r>
+            <a:r>
+              <a:rPr lang="en" sz="2100" dirty="0" smtClean="0">
+                <a:solidFill>
+                  <a:srgbClr val="11889C"/>
+                </a:solidFill>
+                <a:latin typeface="Menlo Regular"/>
+                <a:ea typeface="Menlo Regular"/>
+                <a:cs typeface="Menlo Regular"/>
+                <a:sym typeface="Courier New"/>
+              </a:rPr>
+              <a:t>2020:</a:t>
+            </a:r>
+            <a:endParaRPr lang="en" sz="2100" dirty="0">
+              <a:solidFill>
+                <a:srgbClr val="11889C"/>
+              </a:solidFill>
+              <a:latin typeface="Menlo Regular"/>
+              <a:ea typeface="Menlo Regular"/>
+              <a:cs typeface="Menlo Regular"/>
+              <a:sym typeface="Courier New"/>
+            </a:endParaRPr>
           </a:p>
           <a:p>
             <a:pPr lvl="0" rtl="0">
@@ -21764,7 +22038,31 @@
                 <a:cs typeface="Menlo Regular"/>
                 <a:sym typeface="Courier New"/>
               </a:rPr>
-              <a:t>    puts </a:t>
+              <a:t>    </a:t>
+            </a:r>
+            <a:r>
+              <a:rPr lang="en" sz="2100" dirty="0" smtClean="0">
+                <a:solidFill>
+                  <a:schemeClr val="tx1"/>
+                </a:solidFill>
+                <a:latin typeface="Menlo Regular"/>
+                <a:ea typeface="Menlo Regular"/>
+                <a:cs typeface="Menlo Regular"/>
+                <a:sym typeface="Courier New"/>
+              </a:rPr>
+              <a:t>print(</a:t>
+            </a:r>
+            <a:r>
+              <a:rPr lang="en" sz="2100" dirty="0" smtClean="0">
+                <a:solidFill>
+                  <a:srgbClr val="FF0000"/>
+                </a:solidFill>
+                <a:latin typeface="Menlo Regular"/>
+                <a:ea typeface="Menlo Regular"/>
+                <a:cs typeface="Menlo Regular"/>
+                <a:sym typeface="Courier New"/>
+              </a:rPr>
+              <a:t>"I </a:t>
             </a:r>
             <a:r>
               <a:rPr lang="en" sz="2100" dirty="0">
@@ -21776,8 +22074,29 @@
                 <a:cs typeface="Menlo Regular"/>
                 <a:sym typeface="Courier New"/>
               </a:rPr>
-              <a:t>"Tell me of the past!"</a:t>
-            </a:r>
+              <a:t>wish you were from a cooler era</a:t>
+            </a:r>
+            <a:r>
+              <a:rPr lang="en" sz="2100" dirty="0" smtClean="0">
+                <a:solidFill>
+                  <a:srgbClr val="FF0000"/>
+                </a:solidFill>
+                <a:latin typeface="Menlo Regular"/>
+                <a:ea typeface="Menlo Regular"/>
+                <a:cs typeface="Menlo Regular"/>
+                <a:sym typeface="Courier New"/>
+              </a:rPr>
+              <a:t>.“)</a:t>
+            </a:r>
+            <a:endParaRPr lang="en" sz="2100" dirty="0">
+              <a:solidFill>
+                <a:srgbClr val="FF0000"/>
+              </a:solidFill>
+              <a:latin typeface="Menlo Regular"/>
+              <a:ea typeface="Menlo Regular"/>
+              <a:cs typeface="Menlo Regular"/>
+              <a:sym typeface="Courier New"/>
+            </a:endParaRPr>
           </a:p>
           <a:p>
             <a:pPr lvl="0" rtl="0">
@@ -21796,44 +22115,106 @@
                 <a:cs typeface="Menlo Regular"/>
                 <a:sym typeface="Courier New"/>
               </a:rPr>
-              <a:t>  elsif year &gt;= </a:t>
-            </a:r>
+              <a:t>  </a:t>
+            </a:r>
+            <a:r>
+              <a:rPr lang="en" sz="2100" dirty="0" smtClean="0">
+                <a:solidFill>
+                  <a:schemeClr val="tx1"/>
+                </a:solidFill>
+                <a:latin typeface="Menlo Regular"/>
+                <a:ea typeface="Menlo Regular"/>
+                <a:cs typeface="Menlo Regular"/>
+                <a:sym typeface="Courier New"/>
+              </a:rPr>
+              <a:t>else:</a:t>
+            </a:r>
+            <a:endParaRPr lang="en" sz="2100" dirty="0">
+              <a:solidFill>
+                <a:schemeClr val="tx1"/>
+              </a:solidFill>
+              <a:latin typeface="Menlo Regular"/>
+              <a:ea typeface="Menlo Regular"/>
+              <a:cs typeface="Menlo Regular"/>
+              <a:sym typeface="Courier New"/>
+            </a:endParaRPr>
+          </a:p>
+          <a:p>
+            <a:pPr lvl="0" rtl="0">
+              <a:spcBef>
+                <a:spcPts val="0"/>
+              </a:spcBef>
+              <a:buNone/>
+            </a:pPr>
             <a:r>
               <a:rPr lang="en" sz="2100" dirty="0">
                 <a:solidFill>
-                  <a:srgbClr val="11889C"/>
-                </a:solidFill>
-                <a:latin typeface="Menlo Regular"/>
-                <a:ea typeface="Menlo Regular"/>
-                <a:cs typeface="Menlo Regular"/>
-                <a:sym typeface="Courier New"/>
-              </a:rPr>
-              <a:t>1900</a:t>
+                  <a:schemeClr val="tx1"/>
+                </a:solidFill>
+                <a:latin typeface="Menlo Regular"/>
+                <a:ea typeface="Menlo Regular"/>
+                <a:cs typeface="Menlo Regular"/>
+                <a:sym typeface="Courier New"/>
+              </a:rPr>
+              <a:t>    </a:t>
+            </a:r>
+            <a:r>
+              <a:rPr lang="en" sz="2100" dirty="0" smtClean="0">
+                <a:solidFill>
+                  <a:schemeClr val="tx1"/>
+                </a:solidFill>
+                <a:latin typeface="Menlo Regular"/>
+                <a:ea typeface="Menlo Regular"/>
+                <a:cs typeface="Menlo Regular"/>
+                <a:sym typeface="Courier New"/>
+              </a:rPr>
+              <a:t>print(</a:t>
+            </a:r>
+            <a:r>
+              <a:rPr lang="en" sz="2100" dirty="0" smtClean="0">
+                <a:solidFill>
+                  <a:srgbClr val="FF0000"/>
+                </a:solidFill>
+                <a:latin typeface="Menlo Regular"/>
+                <a:ea typeface="Menlo Regular"/>
+                <a:cs typeface="Menlo Regular"/>
+                <a:sym typeface="Courier New"/>
+              </a:rPr>
+              <a:t>"Hello</a:t>
             </a:r>
             <a:r>
               <a:rPr lang="en" sz="2100" dirty="0">
                 <a:solidFill>
-                  <a:schemeClr val="tx1"/>
-                </a:solidFill>
-                <a:latin typeface="Menlo Regular"/>
-                <a:ea typeface="Menlo Regular"/>
-                <a:cs typeface="Menlo Regular"/>
-                <a:sym typeface="Courier New"/>
-              </a:rPr>
-              <a:t> &amp;&amp; year &lt;= </a:t>
-            </a:r>
-            <a:r>
-              <a:rPr lang="en" sz="2100" dirty="0">
-                <a:solidFill>
-                  <a:srgbClr val="11889C"/>
-                </a:solidFill>
-                <a:latin typeface="Menlo Regular"/>
-                <a:ea typeface="Menlo Regular"/>
-                <a:cs typeface="Menlo Regular"/>
-                <a:sym typeface="Courier New"/>
-              </a:rPr>
-              <a:t>2020</a:t>
-            </a:r>
+                  <a:srgbClr val="FF0000"/>
+                </a:solidFill>
+                <a:latin typeface="Menlo Regular"/>
+                <a:ea typeface="Menlo Regular"/>
+                <a:cs typeface="Menlo Regular"/>
+                <a:sym typeface="Courier New"/>
+              </a:rPr>
+              <a:t>, future traveller</a:t>
+            </a:r>
+            <a:r>
+              <a:rPr lang="en" sz="2100" dirty="0" smtClean="0">
+                <a:solidFill>
+                  <a:srgbClr val="FF0000"/>
+                </a:solidFill>
+                <a:latin typeface="Menlo Regular"/>
+                <a:ea typeface="Menlo Regular"/>
+                <a:cs typeface="Menlo Regular"/>
+                <a:sym typeface="Courier New"/>
+              </a:rPr>
+              <a:t>.“)</a:t>
+            </a:r>
+            <a:endParaRPr lang="en" sz="2100" dirty="0">
+              <a:solidFill>
+                <a:srgbClr val="FF0000"/>
+              </a:solidFill>
+              <a:latin typeface="Menlo Regular"/>
+              <a:ea typeface="Menlo Regular"/>
+              <a:cs typeface="Menlo Regular"/>
+              <a:sym typeface="Courier New"/>
+            </a:endParaRPr>
           </a:p>
           <a:p>
             <a:pPr lvl="0" rtl="0">
@@ -21842,30 +22223,15 @@
               </a:spcBef>
               <a:buNone/>
             </a:pPr>
-            <a:r>
-              <a:rPr lang="en" sz="2100" dirty="0">
-                <a:solidFill>
-                  <a:schemeClr val="tx1"/>
-                </a:solidFill>
-                <a:latin typeface="Menlo Regular"/>
-                <a:ea typeface="Menlo Regular"/>
-                <a:cs typeface="Menlo Regular"/>
-                <a:sym typeface="Courier New"/>
-              </a:rPr>
-              <a:t>    puts </a:t>
-            </a:r>
-            <a:r>
-              <a:rPr lang="en" sz="2100" dirty="0">
-                <a:solidFill>
-                  <a:srgbClr val="FF0000"/>
-                </a:solidFill>
-                <a:latin typeface="Menlo Regular"/>
-                <a:ea typeface="Menlo Regular"/>
-                <a:cs typeface="Menlo Regular"/>
-                <a:sym typeface="Courier New"/>
-              </a:rPr>
-              <a:t>"I wish you were from a cooler era."</a:t>
-            </a:r>
+            <a:endParaRPr lang="en" sz="2100" dirty="0">
+              <a:solidFill>
+                <a:schemeClr val="tx1"/>
+              </a:solidFill>
+              <a:latin typeface="Menlo Regular"/>
+              <a:ea typeface="Menlo Regular"/>
+              <a:cs typeface="Menlo Regular"/>
+              <a:sym typeface="Courier New"/>
+            </a:endParaRPr>
           </a:p>
           <a:p>
             <a:pPr lvl="0" rtl="0">
@@ -21874,18 +22240,7 @@
               </a:spcBef>
               <a:buNone/>
             </a:pPr>
-            <a:r>
-              <a:rPr lang="en" sz="2100" dirty="0">
-                <a:solidFill>
-                  <a:schemeClr val="tx1"/>
-                </a:solidFill>
-                <a:latin typeface="Menlo Regular"/>
-                <a:ea typeface="Menlo Regular"/>
-                <a:cs typeface="Menlo Regular"/>
-                <a:sym typeface="Courier New"/>
-              </a:rPr>
-              <a:t>  else</a:t>
-            </a:r>
+            <a:endParaRPr sz="1200" dirty="0"/>
           </a:p>
           <a:p>
             <a:pPr lvl="0" rtl="0">
@@ -21895,29 +22250,14 @@
               <a:buNone/>
             </a:pPr>
             <a:r>
-              <a:rPr lang="en" sz="2100" dirty="0">
-                <a:solidFill>
-                  <a:schemeClr val="tx1"/>
-                </a:solidFill>
-                <a:latin typeface="Menlo Regular"/>
-                <a:ea typeface="Menlo Regular"/>
-                <a:cs typeface="Menlo Regular"/>
-                <a:sym typeface="Courier New"/>
-              </a:rPr>
-              <a:t>    puts </a:t>
-            </a:r>
-            <a:r>
-              <a:rPr lang="en" sz="2100" dirty="0">
-                <a:solidFill>
-                  <a:srgbClr val="FF0000"/>
-                </a:solidFill>
-                <a:latin typeface="Menlo Regular"/>
-                <a:ea typeface="Menlo Regular"/>
-                <a:cs typeface="Menlo Regular"/>
-                <a:sym typeface="Courier New"/>
-              </a:rPr>
-              <a:t>"Hello, future traveller."</a:t>
-            </a:r>
+              <a:rPr lang="en-US" sz="2200" dirty="0"/>
+              <a:t>g</a:t>
+            </a:r>
+            <a:r>
+              <a:rPr lang="en" sz="2200" dirty="0" smtClean="0"/>
+              <a:t>reeting(1878)</a:t>
+            </a:r>
+            <a:endParaRPr lang="en" sz="2200" dirty="0"/>
           </a:p>
           <a:p>
             <a:pPr lvl="0" rtl="0">
@@ -21927,17 +22267,18 @@
               <a:buNone/>
             </a:pPr>
             <a:r>
-              <a:rPr lang="en" sz="2100" dirty="0">
-                <a:solidFill>
-                  <a:schemeClr val="tx1"/>
-                </a:solidFill>
-                <a:latin typeface="Menlo Regular"/>
-                <a:ea typeface="Menlo Regular"/>
-                <a:cs typeface="Menlo Regular"/>
-                <a:sym typeface="Courier New"/>
-              </a:rPr>
-              <a:t>  end</a:t>
-            </a:r>
+              <a:rPr lang="en-US" sz="2200" dirty="0"/>
+              <a:t>g</a:t>
+            </a:r>
+            <a:r>
+              <a:rPr lang="en" sz="2200" smtClean="0"/>
+              <a:t>reeting(2013</a:t>
+            </a:r>
+            <a:r>
+              <a:rPr lang="en" sz="2200" dirty="0" smtClean="0"/>
+              <a:t>)</a:t>
+            </a:r>
+            <a:endParaRPr lang="en" sz="2200" dirty="0"/>
           </a:p>
           <a:p>
             <a:pPr lvl="0" rtl="0">
@@ -21947,62 +22288,14 @@
               <a:buNone/>
             </a:pPr>
             <a:r>
-              <a:rPr lang="en" sz="2100" dirty="0">
-                <a:solidFill>
-                  <a:schemeClr val="tx1"/>
-                </a:solidFill>
-                <a:latin typeface="Menlo Regular"/>
-                <a:ea typeface="Menlo Regular"/>
-                <a:cs typeface="Menlo Regular"/>
-                <a:sym typeface="Courier New"/>
-              </a:rPr>
-              <a:t>end</a:t>
-            </a:r>
-          </a:p>
-          <a:p>
-            <a:pPr lvl="0" rtl="0">
-              <a:spcBef>
-                <a:spcPts val="0"/>
-              </a:spcBef>
-              <a:buNone/>
-            </a:pPr>
-            <a:endParaRPr sz="1200" dirty="0"/>
-          </a:p>
-          <a:p>
-            <a:pPr lvl="0" rtl="0">
-              <a:spcBef>
-                <a:spcPts val="0"/>
-              </a:spcBef>
-              <a:buNone/>
-            </a:pPr>
-            <a:r>
-              <a:rPr lang="en" sz="2200" dirty="0"/>
-              <a:t>greeting 1878</a:t>
-            </a:r>
-          </a:p>
-          <a:p>
-            <a:pPr lvl="0" rtl="0">
-              <a:spcBef>
-                <a:spcPts val="0"/>
-              </a:spcBef>
-              <a:buNone/>
-            </a:pPr>
-            <a:r>
-              <a:rPr lang="en" sz="2200" dirty="0"/>
-              <a:t>greeting 2013</a:t>
-            </a:r>
-          </a:p>
-          <a:p>
-            <a:pPr lvl="0" rtl="0">
-              <a:spcBef>
-                <a:spcPts val="0"/>
-              </a:spcBef>
-              <a:buNone/>
-            </a:pPr>
-            <a:r>
-              <a:rPr lang="en" sz="2200" dirty="0"/>
-              <a:t>greeting 3000</a:t>
-            </a:r>
+              <a:rPr lang="en-US" sz="2200" dirty="0"/>
+              <a:t>g</a:t>
+            </a:r>
+            <a:r>
+              <a:rPr lang="en" sz="2200" dirty="0" smtClean="0"/>
+              <a:t>reeting(3000)</a:t>
+            </a:r>
+            <a:endParaRPr lang="en" sz="2200" dirty="0"/>
           </a:p>
         </p:txBody>
       </p:sp>
@@ -22581,19 +22874,7 @@
                 <a:cs typeface="Menlo Regular"/>
                 <a:sym typeface="Courier New"/>
               </a:rPr>
-              <a:t>:</a:t>
-            </a:r>
-            <a:r>
-              <a:rPr lang="en" sz="2200" dirty="0" smtClean="0">
-                <a:solidFill>
-                  <a:schemeClr val="tx1"/>
-                </a:solidFill>
-                <a:latin typeface="Menlo Regular"/>
-                <a:ea typeface="Menlo Regular"/>
-                <a:cs typeface="Menlo Regular"/>
-                <a:sym typeface="Courier New"/>
-              </a:rPr>
-              <a:t> </a:t>
+              <a:t>: </a:t>
             </a:r>
             <a:r>
               <a:rPr lang="en" sz="2200" dirty="0">

</xml_diff>

<commit_message>
updating section on slices in programming concepts ii - should be done now
</commit_message>
<xml_diff>
--- a/2017/python/B Done - ish/Python - Programming Concepts II.pptx
+++ b/2017/python/B Done - ish/Python - Programming Concepts II.pptx
@@ -18453,29 +18453,22 @@
               <a:buNone/>
             </a:pPr>
             <a:r>
-              <a:rPr lang="en" sz="9600" dirty="0">
+              <a:rPr lang="en" sz="8800" dirty="0" smtClean="0">
                 <a:solidFill>
                   <a:srgbClr val="FF0000"/>
                 </a:solidFill>
                 <a:latin typeface="Yanone Kaffeesatz Bold"/>
                 <a:cs typeface="Yanone Kaffeesatz Bold"/>
               </a:rPr>
-              <a:t>Splat</a:t>
-            </a:r>
-            <a:r>
-              <a:rPr lang="en" dirty="0"/>
-              <a:t> </a:t>
-            </a:r>
-            <a:r>
-              <a:rPr lang="en" sz="9600" dirty="0">
-                <a:solidFill>
-                  <a:srgbClr val="FF0000"/>
-                </a:solidFill>
-                <a:latin typeface="Yanone Kaffeesatz Bold"/>
-                <a:cs typeface="Yanone Kaffeesatz Bold"/>
-              </a:rPr>
-              <a:t>Operator</a:t>
-            </a:r>
+              <a:t>slice</a:t>
+            </a:r>
+            <a:endParaRPr lang="en" sz="9600" dirty="0">
+              <a:solidFill>
+                <a:srgbClr val="FF0000"/>
+              </a:solidFill>
+              <a:latin typeface="Yanone Kaffeesatz Bold"/>
+              <a:cs typeface="Yanone Kaffeesatz Bold"/>
+            </a:endParaRPr>
           </a:p>
         </p:txBody>
       </p:sp>
@@ -18511,7 +18504,7 @@
               <a:buNone/>
             </a:pPr>
             <a:r>
-              <a:rPr lang="en" sz="2700" dirty="0">
+              <a:rPr lang="en-US" sz="2400" dirty="0" smtClean="0">
                 <a:solidFill>
                   <a:schemeClr val="tx1"/>
                 </a:solidFill>
@@ -18520,22 +18513,10 @@
                 <a:cs typeface="Menlo Regular"/>
                 <a:sym typeface="Courier New"/>
               </a:rPr>
-              <a:t>numbers = (</a:t>
-            </a:r>
-            <a:r>
-              <a:rPr lang="en" sz="2700" dirty="0">
-                <a:solidFill>
-                  <a:srgbClr val="11889C"/>
-                </a:solidFill>
-                <a:latin typeface="Menlo Regular"/>
-                <a:ea typeface="Menlo Regular"/>
-                <a:cs typeface="Menlo Regular"/>
-                <a:sym typeface="Courier New"/>
-              </a:rPr>
-              <a:t>1</a:t>
-            </a:r>
-            <a:r>
-              <a:rPr lang="en" sz="2700" dirty="0">
+              <a:t>&gt;&gt;&gt; a</a:t>
+            </a:r>
+            <a:r>
+              <a:rPr lang="en" sz="2400" dirty="0" smtClean="0">
                 <a:solidFill>
                   <a:schemeClr val="tx1"/>
                 </a:solidFill>
@@ -18544,22 +18525,18 @@
                 <a:cs typeface="Menlo Regular"/>
                 <a:sym typeface="Courier New"/>
               </a:rPr>
-              <a:t>..</a:t>
-            </a:r>
-            <a:r>
-              <a:rPr lang="en" sz="2700" dirty="0">
-                <a:solidFill>
-                  <a:srgbClr val="11889C"/>
-                </a:solidFill>
-                <a:latin typeface="Menlo Regular"/>
-                <a:ea typeface="Menlo Regular"/>
-                <a:cs typeface="Menlo Regular"/>
-                <a:sym typeface="Courier New"/>
-              </a:rPr>
-              <a:t>10</a:t>
-            </a:r>
-            <a:r>
-              <a:rPr lang="en" sz="2700" dirty="0">
+              <a:t>lphabet = “abcdefghijklmnopqrstuvwxyz”</a:t>
+            </a:r>
+          </a:p>
+          <a:p>
+            <a:pPr lvl="0" rtl="0">
+              <a:spcBef>
+                <a:spcPts val="0"/>
+              </a:spcBef>
+              <a:buNone/>
+            </a:pPr>
+            <a:r>
+              <a:rPr lang="en" sz="2400" dirty="0" smtClean="0">
                 <a:solidFill>
                   <a:schemeClr val="tx1"/>
                 </a:solidFill>
@@ -18568,15 +18545,18 @@
                 <a:cs typeface="Menlo Regular"/>
                 <a:sym typeface="Courier New"/>
               </a:rPr>
-              <a:t>).to_a</a:t>
-            </a:r>
-          </a:p>
-          <a:p>
-            <a:pPr>
-              <a:buNone/>
-            </a:pPr>
-            <a:r>
-              <a:rPr lang="en" sz="2700" dirty="0" smtClean="0">
+              <a:t>&gt;&gt;&gt; alphabet[1]</a:t>
+            </a:r>
+          </a:p>
+          <a:p>
+            <a:pPr lvl="0" rtl="0">
+              <a:spcBef>
+                <a:spcPts val="0"/>
+              </a:spcBef>
+              <a:buNone/>
+            </a:pPr>
+            <a:r>
+              <a:rPr lang="en" sz="2400" dirty="0" smtClean="0">
                 <a:solidFill>
                   <a:schemeClr val="tx1"/>
                 </a:solidFill>
@@ -18585,22 +18565,18 @@
                 <a:cs typeface="Menlo Regular"/>
                 <a:sym typeface="Courier New"/>
               </a:rPr>
-              <a:t>letters = (</a:t>
-            </a:r>
-            <a:r>
-              <a:rPr lang="en" sz="2700" dirty="0" smtClean="0">
-                <a:solidFill>
-                  <a:srgbClr val="FF0000"/>
-                </a:solidFill>
-                <a:latin typeface="Menlo Regular"/>
-                <a:ea typeface="Menlo Regular"/>
-                <a:cs typeface="Menlo Regular"/>
-                <a:sym typeface="Courier New"/>
-              </a:rPr>
-              <a:t>'a'</a:t>
-            </a:r>
-            <a:r>
-              <a:rPr lang="en" sz="2700" dirty="0" smtClean="0">
+              <a:t>“b”</a:t>
+            </a:r>
+          </a:p>
+          <a:p>
+            <a:pPr lvl="0" rtl="0">
+              <a:spcBef>
+                <a:spcPts val="0"/>
+              </a:spcBef>
+              <a:buNone/>
+            </a:pPr>
+            <a:r>
+              <a:rPr lang="en" sz="2400" dirty="0" smtClean="0">
                 <a:solidFill>
                   <a:schemeClr val="tx1"/>
                 </a:solidFill>
@@ -18609,34 +18585,18 @@
                 <a:cs typeface="Menlo Regular"/>
                 <a:sym typeface="Courier New"/>
               </a:rPr>
-              <a:t>..</a:t>
-            </a:r>
-            <a:r>
-              <a:rPr lang="en" sz="2700" dirty="0" smtClean="0">
-                <a:solidFill>
-                  <a:srgbClr val="FF0000"/>
-                </a:solidFill>
-                <a:latin typeface="Menlo Regular"/>
-                <a:ea typeface="Menlo Regular"/>
-                <a:cs typeface="Menlo Regular"/>
-                <a:sym typeface="Courier New"/>
-              </a:rPr>
-              <a:t>'z')</a:t>
-            </a:r>
-            <a:r>
-              <a:rPr lang="en-US" sz="2700" dirty="0" smtClean="0">
-                <a:solidFill>
-                  <a:srgbClr val="FF0000"/>
-                </a:solidFill>
-                <a:latin typeface="Menlo Regular"/>
-                <a:ea typeface="Menlo Regular"/>
-                <a:cs typeface="Menlo Regular"/>
-                <a:sym typeface="Courier New"/>
-              </a:rPr>
-              <a:t>.</a:t>
-            </a:r>
-            <a:r>
-              <a:rPr lang="en" sz="2700" dirty="0" smtClean="0">
+              <a:t>&gt;&gt;&gt; alphabet[2:7]</a:t>
+            </a:r>
+          </a:p>
+          <a:p>
+            <a:pPr lvl="0" rtl="0">
+              <a:spcBef>
+                <a:spcPts val="0"/>
+              </a:spcBef>
+              <a:buNone/>
+            </a:pPr>
+            <a:r>
+              <a:rPr lang="en" sz="2400" dirty="0" smtClean="0">
                 <a:solidFill>
                   <a:schemeClr val="tx1"/>
                 </a:solidFill>
@@ -18645,9 +18605,57 @@
                 <a:cs typeface="Menlo Regular"/>
                 <a:sym typeface="Courier New"/>
               </a:rPr>
-              <a:t>to_a</a:t>
-            </a:r>
-            <a:endParaRPr lang="en" sz="2700" dirty="0">
+              <a:t>“cdefg”</a:t>
+            </a:r>
+          </a:p>
+          <a:p>
+            <a:pPr lvl="0" rtl="0">
+              <a:spcBef>
+                <a:spcPts val="0"/>
+              </a:spcBef>
+              <a:buNone/>
+            </a:pPr>
+            <a:r>
+              <a:rPr lang="en" sz="2400" dirty="0" smtClean="0">
+                <a:solidFill>
+                  <a:schemeClr val="tx1"/>
+                </a:solidFill>
+                <a:latin typeface="Menlo Regular"/>
+                <a:ea typeface="Menlo Regular"/>
+                <a:cs typeface="Menlo Regular"/>
+                <a:sym typeface="Courier New"/>
+              </a:rPr>
+              <a:t>&gt;&gt;&gt; alphabet[-2:]</a:t>
+            </a:r>
+          </a:p>
+          <a:p>
+            <a:pPr lvl="0" rtl="0">
+              <a:spcBef>
+                <a:spcPts val="0"/>
+              </a:spcBef>
+              <a:buNone/>
+            </a:pPr>
+            <a:r>
+              <a:rPr lang="en" sz="2400" dirty="0" smtClean="0">
+                <a:solidFill>
+                  <a:schemeClr val="tx1"/>
+                </a:solidFill>
+                <a:latin typeface="Menlo Regular"/>
+                <a:ea typeface="Menlo Regular"/>
+                <a:cs typeface="Menlo Regular"/>
+                <a:sym typeface="Courier New"/>
+              </a:rPr>
+              <a:t>“yz”</a:t>
+            </a:r>
+          </a:p>
+          <a:p>
+            <a:pPr lvl="0" rtl="0">
+              <a:spcBef>
+                <a:spcPts val="0"/>
+              </a:spcBef>
+              <a:buNone/>
+            </a:pPr>
+            <a:endParaRPr lang="en" sz="2400" dirty="0" smtClean="0">
               <a:solidFill>
                 <a:schemeClr val="tx1"/>
               </a:solidFill>
@@ -18664,24 +18672,67 @@
               </a:spcBef>
               <a:buNone/>
             </a:pPr>
+            <a:r>
+              <a:rPr lang="en" sz="2400" dirty="0" smtClean="0">
+                <a:solidFill>
+                  <a:schemeClr val="tx1"/>
+                </a:solidFill>
+                <a:latin typeface="Menlo Regular"/>
+                <a:ea typeface="Menlo Regular"/>
+                <a:cs typeface="Menlo Regular"/>
+                <a:sym typeface="Courier New"/>
+              </a:rPr>
+              <a:t>&gt;&gt;&gt; list = [“a”, “b”, “c”, “d”, “e”]</a:t>
+            </a:r>
+          </a:p>
+          <a:p>
+            <a:pPr lvl="0" rtl="0">
+              <a:spcBef>
+                <a:spcPts val="0"/>
+              </a:spcBef>
+              <a:buNone/>
+            </a:pPr>
+            <a:r>
+              <a:rPr lang="en" sz="2400" dirty="0" smtClean="0">
+                <a:solidFill>
+                  <a:schemeClr val="tx1"/>
+                </a:solidFill>
+                <a:latin typeface="Menlo Regular"/>
+                <a:ea typeface="Menlo Regular"/>
+                <a:cs typeface="Menlo Regular"/>
+                <a:sym typeface="Courier New"/>
+              </a:rPr>
+              <a:t>&gt;&gt;&gt; list[:-1]</a:t>
+            </a:r>
+          </a:p>
+          <a:p>
+            <a:pPr lvl="0" rtl="0">
+              <a:spcBef>
+                <a:spcPts val="0"/>
+              </a:spcBef>
+              <a:buNone/>
+            </a:pPr>
+            <a:r>
+              <a:rPr lang="en" sz="2400" dirty="0" smtClean="0">
+                <a:solidFill>
+                  <a:schemeClr val="tx1"/>
+                </a:solidFill>
+                <a:latin typeface="Menlo Regular"/>
+                <a:ea typeface="Menlo Regular"/>
+                <a:cs typeface="Menlo Regular"/>
+                <a:sym typeface="Courier New"/>
+              </a:rPr>
+              <a:t>[‘a’, ‘b’, ‘c’, ‘d’]</a:t>
+            </a:r>
+          </a:p>
+          <a:p>
+            <a:pPr lvl="0" rtl="0">
+              <a:spcBef>
+                <a:spcPts val="0"/>
+              </a:spcBef>
+              <a:buNone/>
+            </a:pPr>
             <a:endParaRPr lang="en" sz="2700" dirty="0" smtClean="0">
-              <a:solidFill>
-                <a:srgbClr val="FF0000"/>
-              </a:solidFill>
-              <a:latin typeface="Menlo Regular"/>
-              <a:ea typeface="Menlo Regular"/>
-              <a:cs typeface="Menlo Regular"/>
-              <a:sym typeface="Courier New"/>
-            </a:endParaRPr>
-          </a:p>
-          <a:p>
-            <a:pPr lvl="0" rtl="0">
-              <a:spcBef>
-                <a:spcPts val="0"/>
-              </a:spcBef>
-              <a:buNone/>
-            </a:pPr>
-            <a:endParaRPr sz="2700" dirty="0">
               <a:solidFill>
                 <a:schemeClr val="tx1"/>
               </a:solidFill>
@@ -18699,7 +18750,7 @@
               <a:buNone/>
             </a:pPr>
             <a:r>
-              <a:rPr lang="en" sz="2700" dirty="0">
+              <a:rPr lang="en" sz="2700" dirty="0" smtClean="0">
                 <a:solidFill>
                   <a:schemeClr val="tx1"/>
                 </a:solidFill>
@@ -18708,22 +18759,10 @@
                 <a:cs typeface="Menlo Regular"/>
                 <a:sym typeface="Courier New"/>
               </a:rPr>
-              <a:t>puts numbers.include?(</a:t>
-            </a:r>
-            <a:r>
-              <a:rPr lang="en" sz="2700" dirty="0">
-                <a:solidFill>
-                  <a:srgbClr val="11889C"/>
-                </a:solidFill>
-                <a:latin typeface="Menlo Regular"/>
-                <a:ea typeface="Menlo Regular"/>
-                <a:cs typeface="Menlo Regular"/>
-                <a:sym typeface="Courier New"/>
-              </a:rPr>
-              <a:t>5</a:t>
-            </a:r>
-            <a:r>
-              <a:rPr lang="en" sz="2700" dirty="0">
+              <a:t>For more see the </a:t>
+            </a:r>
+            <a:r>
+              <a:rPr lang="en" sz="2700" dirty="0" smtClean="0">
                 <a:solidFill>
                   <a:schemeClr val="tx1"/>
                 </a:solidFill>
@@ -18731,111 +18770,19 @@
                 <a:ea typeface="Menlo Regular"/>
                 <a:cs typeface="Menlo Regular"/>
                 <a:sym typeface="Courier New"/>
-              </a:rPr>
-              <a:t>)</a:t>
-            </a:r>
-          </a:p>
-          <a:p>
-            <a:pPr lvl="0" rtl="0">
-              <a:spcBef>
-                <a:spcPts val="0"/>
-              </a:spcBef>
-              <a:buNone/>
-            </a:pPr>
-            <a:r>
-              <a:rPr lang="en" sz="2700" dirty="0">
-                <a:solidFill>
-                  <a:schemeClr val="tx1"/>
-                </a:solidFill>
-                <a:latin typeface="Menlo Regular"/>
-                <a:ea typeface="Menlo Regular"/>
-                <a:cs typeface="Menlo Regular"/>
-                <a:sym typeface="Courier New"/>
-              </a:rPr>
-              <a:t>puts numbers.min</a:t>
-            </a:r>
-          </a:p>
-          <a:p>
-            <a:pPr lvl="0" rtl="0">
-              <a:spcBef>
-                <a:spcPts val="0"/>
-              </a:spcBef>
-              <a:buNone/>
-            </a:pPr>
-            <a:r>
-              <a:rPr lang="en" sz="2700" dirty="0">
-                <a:solidFill>
-                  <a:schemeClr val="tx1"/>
-                </a:solidFill>
-                <a:latin typeface="Menlo Regular"/>
-                <a:ea typeface="Menlo Regular"/>
-                <a:cs typeface="Menlo Regular"/>
-                <a:sym typeface="Courier New"/>
-              </a:rPr>
-              <a:t>puts numbers.max</a:t>
-            </a:r>
-          </a:p>
-          <a:p>
-            <a:pPr lvl="0" rtl="0">
-              <a:spcBef>
-                <a:spcPts val="0"/>
-              </a:spcBef>
-              <a:buNone/>
-            </a:pPr>
-            <a:r>
-              <a:rPr lang="en" sz="2700" dirty="0">
-                <a:solidFill>
-                  <a:schemeClr val="tx1"/>
-                </a:solidFill>
-                <a:latin typeface="Menlo Regular"/>
-                <a:ea typeface="Menlo Regular"/>
-                <a:cs typeface="Menlo Regular"/>
-                <a:sym typeface="Courier New"/>
-              </a:rPr>
-              <a:t> </a:t>
-            </a:r>
-          </a:p>
-          <a:p>
-            <a:pPr>
-              <a:spcBef>
-                <a:spcPts val="0"/>
-              </a:spcBef>
-              <a:buNone/>
-            </a:pPr>
-            <a:r>
-              <a:rPr lang="en" sz="2700" dirty="0">
-                <a:solidFill>
-                  <a:schemeClr val="tx1"/>
-                </a:solidFill>
-                <a:latin typeface="Menlo Regular"/>
-                <a:ea typeface="Menlo Regular"/>
-                <a:cs typeface="Menlo Regular"/>
-                <a:sym typeface="Courier New"/>
-              </a:rPr>
-              <a:t>puts letters === </a:t>
-            </a:r>
-            <a:r>
-              <a:rPr lang="en" sz="2700" dirty="0">
-                <a:solidFill>
-                  <a:srgbClr val="FF0000"/>
-                </a:solidFill>
-                <a:latin typeface="Menlo Regular"/>
-                <a:ea typeface="Menlo Regular"/>
-                <a:cs typeface="Menlo Regular"/>
-                <a:sym typeface="Courier New"/>
-              </a:rPr>
-              <a:t>'c'</a:t>
-            </a:r>
-            <a:r>
-              <a:rPr lang="en" sz="2700" dirty="0">
-                <a:solidFill>
-                  <a:schemeClr val="tx1"/>
-                </a:solidFill>
-                <a:latin typeface="Menlo Regular"/>
-                <a:cs typeface="Menlo Regular"/>
-              </a:rPr>
-              <a:t> </a:t>
-            </a:r>
+                <a:hlinkClick r:id="rId3"/>
+              </a:rPr>
+              <a:t>documentation!</a:t>
+            </a:r>
+            <a:endParaRPr lang="en" sz="2700" dirty="0" smtClean="0">
+              <a:solidFill>
+                <a:schemeClr val="tx1"/>
+              </a:solidFill>
+              <a:latin typeface="Menlo Regular"/>
+              <a:ea typeface="Menlo Regular"/>
+              <a:cs typeface="Menlo Regular"/>
+              <a:sym typeface="Courier New"/>
+            </a:endParaRPr>
           </a:p>
         </p:txBody>
       </p:sp>

</xml_diff>